<commit_message>
edits to identifier lecture
</commit_message>
<xml_diff>
--- a/Day_1/Lectures/Slides/Day_1_Lecture_Identifier.pptx
+++ b/Day_1/Lectures/Slides/Day_1_Lecture_Identifier.pptx
@@ -5,7 +5,7 @@
     <p:sldMasterId id="2147483648" r:id="rId1"/>
   </p:sldMasterIdLst>
   <p:notesMasterIdLst>
-    <p:notesMasterId r:id="rId14"/>
+    <p:notesMasterId r:id="rId17"/>
   </p:notesMasterIdLst>
   <p:sldIdLst>
     <p:sldId id="256" r:id="rId2"/>
@@ -18,8 +18,11 @@
     <p:sldId id="261" r:id="rId9"/>
     <p:sldId id="262" r:id="rId10"/>
     <p:sldId id="265" r:id="rId11"/>
-    <p:sldId id="268" r:id="rId12"/>
-    <p:sldId id="267" r:id="rId13"/>
+    <p:sldId id="272" r:id="rId12"/>
+    <p:sldId id="273" r:id="rId13"/>
+    <p:sldId id="267" r:id="rId14"/>
+    <p:sldId id="269" r:id="rId15"/>
+    <p:sldId id="271" r:id="rId16"/>
   </p:sldIdLst>
   <p:sldSz cx="9144000" cy="6858000" type="screen4x3"/>
   <p:notesSz cx="6858000" cy="9144000"/>
@@ -203,7 +206,7 @@
           <a:p>
             <a:fld id="{F812B0B4-9C1E-C84F-91DC-C94EF554C0AE}" type="datetimeFigureOut">
               <a:rPr lang="en-US" smtClean="0"/>
-              <a:t>1/19/15</a:t>
+              <a:t>1/27/15</a:t>
             </a:fld>
             <a:endParaRPr lang="en-US"/>
           </a:p>
@@ -515,6 +518,10 @@
           <a:bodyPr/>
           <a:lstStyle/>
           <a:p>
+            <a:r>
+              <a:rPr lang="en-US" dirty="0" smtClean="0"/>
+              <a:t>combination of link rot and content drift to which references to web resources included in Science, Technology, and Medicine (STM) articles are subject. W</a:t>
+            </a:r>
             <a:endParaRPr lang="en-US" dirty="0"/>
           </a:p>
         </p:txBody>
@@ -874,7 +881,7 @@
           <a:p>
             <a:fld id="{9D6228D5-5F93-BB4A-964B-203967C46295}" type="datetimeFigureOut">
               <a:rPr lang="en-US" smtClean="0"/>
-              <a:t>1/19/15</a:t>
+              <a:t>1/27/15</a:t>
             </a:fld>
             <a:endParaRPr lang="en-US"/>
           </a:p>
@@ -1044,7 +1051,7 @@
           <a:p>
             <a:fld id="{9D6228D5-5F93-BB4A-964B-203967C46295}" type="datetimeFigureOut">
               <a:rPr lang="en-US" smtClean="0"/>
-              <a:t>1/19/15</a:t>
+              <a:t>1/27/15</a:t>
             </a:fld>
             <a:endParaRPr lang="en-US"/>
           </a:p>
@@ -1224,7 +1231,7 @@
           <a:p>
             <a:fld id="{9D6228D5-5F93-BB4A-964B-203967C46295}" type="datetimeFigureOut">
               <a:rPr lang="en-US" smtClean="0"/>
-              <a:t>1/19/15</a:t>
+              <a:t>1/27/15</a:t>
             </a:fld>
             <a:endParaRPr lang="en-US"/>
           </a:p>
@@ -1394,7 +1401,7 @@
           <a:p>
             <a:fld id="{9D6228D5-5F93-BB4A-964B-203967C46295}" type="datetimeFigureOut">
               <a:rPr lang="en-US" smtClean="0"/>
-              <a:t>1/19/15</a:t>
+              <a:t>1/27/15</a:t>
             </a:fld>
             <a:endParaRPr lang="en-US"/>
           </a:p>
@@ -1640,7 +1647,7 @@
           <a:p>
             <a:fld id="{9D6228D5-5F93-BB4A-964B-203967C46295}" type="datetimeFigureOut">
               <a:rPr lang="en-US" smtClean="0"/>
-              <a:t>1/19/15</a:t>
+              <a:t>1/27/15</a:t>
             </a:fld>
             <a:endParaRPr lang="en-US"/>
           </a:p>
@@ -1928,7 +1935,7 @@
           <a:p>
             <a:fld id="{9D6228D5-5F93-BB4A-964B-203967C46295}" type="datetimeFigureOut">
               <a:rPr lang="en-US" smtClean="0"/>
-              <a:t>1/19/15</a:t>
+              <a:t>1/27/15</a:t>
             </a:fld>
             <a:endParaRPr lang="en-US"/>
           </a:p>
@@ -2350,7 +2357,7 @@
           <a:p>
             <a:fld id="{9D6228D5-5F93-BB4A-964B-203967C46295}" type="datetimeFigureOut">
               <a:rPr lang="en-US" smtClean="0"/>
-              <a:t>1/19/15</a:t>
+              <a:t>1/27/15</a:t>
             </a:fld>
             <a:endParaRPr lang="en-US"/>
           </a:p>
@@ -2468,7 +2475,7 @@
           <a:p>
             <a:fld id="{9D6228D5-5F93-BB4A-964B-203967C46295}" type="datetimeFigureOut">
               <a:rPr lang="en-US" smtClean="0"/>
-              <a:t>1/19/15</a:t>
+              <a:t>1/27/15</a:t>
             </a:fld>
             <a:endParaRPr lang="en-US"/>
           </a:p>
@@ -2563,7 +2570,7 @@
           <a:p>
             <a:fld id="{9D6228D5-5F93-BB4A-964B-203967C46295}" type="datetimeFigureOut">
               <a:rPr lang="en-US" smtClean="0"/>
-              <a:t>1/19/15</a:t>
+              <a:t>1/27/15</a:t>
             </a:fld>
             <a:endParaRPr lang="en-US"/>
           </a:p>
@@ -2840,7 +2847,7 @@
           <a:p>
             <a:fld id="{9D6228D5-5F93-BB4A-964B-203967C46295}" type="datetimeFigureOut">
               <a:rPr lang="en-US" smtClean="0"/>
-              <a:t>1/19/15</a:t>
+              <a:t>1/27/15</a:t>
             </a:fld>
             <a:endParaRPr lang="en-US"/>
           </a:p>
@@ -3097,7 +3104,7 @@
           <a:p>
             <a:fld id="{9D6228D5-5F93-BB4A-964B-203967C46295}" type="datetimeFigureOut">
               <a:rPr lang="en-US" smtClean="0"/>
-              <a:t>1/19/15</a:t>
+              <a:t>1/27/15</a:t>
             </a:fld>
             <a:endParaRPr lang="en-US"/>
           </a:p>
@@ -3310,7 +3317,7 @@
           <a:p>
             <a:fld id="{9D6228D5-5F93-BB4A-964B-203967C46295}" type="datetimeFigureOut">
               <a:rPr lang="en-US" smtClean="0"/>
-              <a:t>1/19/15</a:t>
+              <a:t>1/27/15</a:t>
             </a:fld>
             <a:endParaRPr lang="en-US"/>
           </a:p>
@@ -3929,6 +3936,160 @@
         </p:nvSpPr>
         <p:spPr/>
         <p:txBody>
+          <a:bodyPr/>
+          <a:lstStyle/>
+          <a:p>
+            <a:r>
+              <a:rPr lang="en-US" dirty="0" smtClean="0"/>
+              <a:t>m:1</a:t>
+            </a:r>
+            <a:endParaRPr lang="en-US" dirty="0"/>
+          </a:p>
+        </p:txBody>
+      </p:sp>
+      <p:sp>
+        <p:nvSpPr>
+          <p:cNvPr id="3" name="Content Placeholder 2"/>
+          <p:cNvSpPr>
+            <a:spLocks noGrp="1"/>
+          </p:cNvSpPr>
+          <p:nvPr>
+            <p:ph idx="1"/>
+          </p:nvPr>
+        </p:nvSpPr>
+        <p:spPr/>
+        <p:txBody>
+          <a:bodyPr/>
+          <a:lstStyle/>
+          <a:p>
+            <a:r>
+              <a:rPr lang="en-US" dirty="0" smtClean="0"/>
+              <a:t>One resource can have many DOIs</a:t>
+            </a:r>
+          </a:p>
+          <a:p>
+            <a:r>
+              <a:rPr lang="en-US" dirty="0" smtClean="0"/>
+              <a:t>This points us to a key challenge….</a:t>
+            </a:r>
+            <a:endParaRPr lang="en-US" dirty="0"/>
+          </a:p>
+        </p:txBody>
+      </p:sp>
+    </p:spTree>
+    <p:extLst>
+      <p:ext uri="{BB962C8B-B14F-4D97-AF65-F5344CB8AC3E}">
+        <p14:creationId xmlns:p14="http://schemas.microsoft.com/office/powerpoint/2010/main" val="2022625081"/>
+      </p:ext>
+    </p:extLst>
+  </p:cSld>
+  <p:clrMapOvr>
+    <a:masterClrMapping/>
+  </p:clrMapOvr>
+</p:sld>
+</file>
+
+<file path=ppt/slides/slide12.xml><?xml version="1.0" encoding="utf-8"?>
+<p:sld xmlns:a="http://schemas.openxmlformats.org/drawingml/2006/main" xmlns:r="http://schemas.openxmlformats.org/officeDocument/2006/relationships" xmlns:p="http://schemas.openxmlformats.org/presentationml/2006/main">
+  <p:cSld>
+    <p:spTree>
+      <p:nvGrpSpPr>
+        <p:cNvPr id="1" name=""/>
+        <p:cNvGrpSpPr/>
+        <p:nvPr/>
+      </p:nvGrpSpPr>
+      <p:grpSpPr>
+        <a:xfrm>
+          <a:off x="0" y="0"/>
+          <a:ext cx="0" cy="0"/>
+          <a:chOff x="0" y="0"/>
+          <a:chExt cx="0" cy="0"/>
+        </a:xfrm>
+      </p:grpSpPr>
+      <p:sp>
+        <p:nvSpPr>
+          <p:cNvPr id="2" name="Title 1"/>
+          <p:cNvSpPr>
+            <a:spLocks noGrp="1"/>
+          </p:cNvSpPr>
+          <p:nvPr>
+            <p:ph type="ctrTitle"/>
+          </p:nvPr>
+        </p:nvSpPr>
+        <p:spPr/>
+        <p:txBody>
+          <a:bodyPr/>
+          <a:lstStyle/>
+          <a:p>
+            <a:r>
+              <a:rPr lang="en-US" dirty="0" smtClean="0"/>
+              <a:t>Challenges</a:t>
+            </a:r>
+            <a:endParaRPr lang="en-US" dirty="0"/>
+          </a:p>
+        </p:txBody>
+      </p:sp>
+      <p:sp>
+        <p:nvSpPr>
+          <p:cNvPr id="3" name="Subtitle 2"/>
+          <p:cNvSpPr>
+            <a:spLocks noGrp="1"/>
+          </p:cNvSpPr>
+          <p:nvPr>
+            <p:ph type="subTitle" idx="1"/>
+          </p:nvPr>
+        </p:nvSpPr>
+        <p:spPr/>
+        <p:txBody>
+          <a:bodyPr/>
+          <a:lstStyle/>
+          <a:p>
+            <a:endParaRPr lang="en-US"/>
+          </a:p>
+        </p:txBody>
+      </p:sp>
+    </p:spTree>
+    <p:extLst>
+      <p:ext uri="{BB962C8B-B14F-4D97-AF65-F5344CB8AC3E}">
+        <p14:creationId xmlns:p14="http://schemas.microsoft.com/office/powerpoint/2010/main" val="357283254"/>
+      </p:ext>
+    </p:extLst>
+  </p:cSld>
+  <p:clrMapOvr>
+    <a:masterClrMapping/>
+  </p:clrMapOvr>
+</p:sld>
+</file>
+
+<file path=ppt/slides/slide13.xml><?xml version="1.0" encoding="utf-8"?>
+<p:sld xmlns:a="http://schemas.openxmlformats.org/drawingml/2006/main" xmlns:r="http://schemas.openxmlformats.org/officeDocument/2006/relationships" xmlns:p="http://schemas.openxmlformats.org/presentationml/2006/main">
+  <p:cSld>
+    <p:spTree>
+      <p:nvGrpSpPr>
+        <p:cNvPr id="1" name=""/>
+        <p:cNvGrpSpPr/>
+        <p:nvPr/>
+      </p:nvGrpSpPr>
+      <p:grpSpPr>
+        <a:xfrm>
+          <a:off x="0" y="0"/>
+          <a:ext cx="0" cy="0"/>
+          <a:chOff x="0" y="0"/>
+          <a:chExt cx="0" cy="0"/>
+        </a:xfrm>
+      </p:grpSpPr>
+      <p:sp>
+        <p:nvSpPr>
+          <p:cNvPr id="2" name="Title 1"/>
+          <p:cNvSpPr>
+            <a:spLocks noGrp="1"/>
+          </p:cNvSpPr>
+          <p:nvPr>
+            <p:ph type="title"/>
+          </p:nvPr>
+        </p:nvSpPr>
+        <p:spPr/>
+        <p:txBody>
           <a:bodyPr>
             <a:normAutofit fontScale="90000"/>
           </a:bodyPr>
@@ -3936,11 +4097,7 @@
           <a:p>
             <a:r>
               <a:rPr lang="en-US" dirty="0" smtClean="0"/>
-              <a:t>Qualities of an </a:t>
-            </a:r>
-            <a:r>
-              <a:rPr lang="en-US" dirty="0" smtClean="0"/>
-              <a:t>ID for data curation</a:t>
+              <a:t>Qualities of an ID for data curation</a:t>
             </a:r>
             <a:endParaRPr lang="en-US" dirty="0"/>
           </a:p>
@@ -3974,16 +4131,15 @@
           </a:p>
           <a:p>
             <a:r>
-              <a:rPr lang="en-US" dirty="0" smtClean="0"/>
+              <a:rPr lang="en-US" b="1" dirty="0" smtClean="0"/>
               <a:t>Persistent</a:t>
             </a:r>
           </a:p>
           <a:p>
             <a:r>
-              <a:rPr lang="en-US" dirty="0" smtClean="0"/>
+              <a:rPr lang="en-US" b="1" dirty="0" smtClean="0"/>
               <a:t>Resolvable</a:t>
             </a:r>
-            <a:endParaRPr lang="en-US" dirty="0" smtClean="0"/>
           </a:p>
           <a:p>
             <a:pPr marL="0" indent="0">
@@ -4013,7 +4169,7 @@
 </p:sld>
 </file>
 
-<file path=ppt/slides/slide12.xml><?xml version="1.0" encoding="utf-8"?>
+<file path=ppt/slides/slide14.xml><?xml version="1.0" encoding="utf-8"?>
 <p:sld xmlns:a="http://schemas.openxmlformats.org/drawingml/2006/main" xmlns:r="http://schemas.openxmlformats.org/officeDocument/2006/relationships" xmlns:p="http://schemas.openxmlformats.org/presentationml/2006/main">
   <p:cSld>
     <p:spTree>
@@ -4042,87 +4198,155 @@
         </p:nvSpPr>
         <p:spPr/>
         <p:txBody>
-          <a:bodyPr>
-            <a:normAutofit fontScale="90000"/>
-          </a:bodyPr>
+          <a:bodyPr/>
           <a:lstStyle/>
           <a:p>
             <a:r>
               <a:rPr lang="en-US" dirty="0" smtClean="0"/>
-              <a:t>Qualities of an </a:t>
-            </a:r>
+              <a:t>An ID alone isn’t enough</a:t>
+            </a:r>
+            <a:endParaRPr lang="en-US" dirty="0"/>
+          </a:p>
+        </p:txBody>
+      </p:sp>
+      <p:sp>
+        <p:nvSpPr>
+          <p:cNvPr id="3" name="Content Placeholder 2"/>
+          <p:cNvSpPr>
+            <a:spLocks noGrp="1"/>
+          </p:cNvSpPr>
+          <p:nvPr>
+            <p:ph idx="1"/>
+          </p:nvPr>
+        </p:nvSpPr>
+        <p:spPr/>
+        <p:txBody>
+          <a:bodyPr/>
+          <a:lstStyle/>
+          <a:p>
             <a:r>
               <a:rPr lang="en-US" dirty="0" smtClean="0"/>
-              <a:t>ID for data curation</a:t>
-            </a:r>
+              <a:t>ID’s are pointers – they need to point to something</a:t>
+            </a:r>
+          </a:p>
+          <a:p>
+            <a:endParaRPr lang="en-US" dirty="0" smtClean="0"/>
+          </a:p>
+          <a:p>
+            <a:r>
+              <a:rPr lang="en-US" dirty="0" smtClean="0"/>
+              <a:t>Just as an address won’t prevent a house from being demolished or remodeled, an ID will not ward off “content drift” or prevent data from being deleted</a:t>
+            </a:r>
+          </a:p>
+          <a:p>
             <a:endParaRPr lang="en-US" dirty="0"/>
-          </a:p>
-        </p:txBody>
-      </p:sp>
-      <p:sp>
-        <p:nvSpPr>
-          <p:cNvPr id="3" name="Content Placeholder 2"/>
-          <p:cNvSpPr>
-            <a:spLocks noGrp="1"/>
-          </p:cNvSpPr>
-          <p:nvPr>
-            <p:ph idx="1"/>
-          </p:nvPr>
-        </p:nvSpPr>
-        <p:spPr/>
-        <p:txBody>
-          <a:bodyPr/>
-          <a:lstStyle/>
-          <a:p>
-            <a:r>
-              <a:rPr lang="en-US" dirty="0" smtClean="0"/>
-              <a:t>Machine Readable</a:t>
-            </a:r>
-          </a:p>
-          <a:p>
-            <a:r>
-              <a:rPr lang="en-US" dirty="0" smtClean="0"/>
-              <a:t>Unique</a:t>
-            </a:r>
-          </a:p>
-          <a:p>
-            <a:r>
-              <a:rPr lang="en-US" dirty="0" smtClean="0"/>
-              <a:t>Persistent</a:t>
-            </a:r>
-          </a:p>
-          <a:p>
-            <a:r>
-              <a:rPr lang="en-US" b="1" dirty="0" smtClean="0"/>
-              <a:t>Resolvable</a:t>
-            </a:r>
-            <a:endParaRPr lang="en-US" b="1" dirty="0" smtClean="0"/>
-          </a:p>
-          <a:p>
-            <a:pPr marL="0" indent="0">
-              <a:buNone/>
-            </a:pPr>
-            <a:endParaRPr lang="en-US" dirty="0" smtClean="0"/>
           </a:p>
         </p:txBody>
       </p:sp>
     </p:spTree>
     <p:extLst>
       <p:ext uri="{BB962C8B-B14F-4D97-AF65-F5344CB8AC3E}">
-        <p14:creationId xmlns:p14="http://schemas.microsoft.com/office/powerpoint/2010/main" val="1631999202"/>
+        <p14:creationId xmlns:p14="http://schemas.microsoft.com/office/powerpoint/2010/main" val="1798583032"/>
       </p:ext>
     </p:extLst>
   </p:cSld>
   <p:clrMapOvr>
     <a:masterClrMapping/>
   </p:clrMapOvr>
-  <p:timing>
-    <p:tnLst>
-      <p:par>
-        <p:cTn xmlns:p14="http://schemas.microsoft.com/office/powerpoint/2010/main" id="1" dur="indefinite" restart="never" nodeType="tmRoot"/>
-      </p:par>
-    </p:tnLst>
-  </p:timing>
+</p:sld>
+</file>
+
+<file path=ppt/slides/slide15.xml><?xml version="1.0" encoding="utf-8"?>
+<p:sld xmlns:a="http://schemas.openxmlformats.org/drawingml/2006/main" xmlns:r="http://schemas.openxmlformats.org/officeDocument/2006/relationships" xmlns:p="http://schemas.openxmlformats.org/presentationml/2006/main">
+  <p:cSld>
+    <p:spTree>
+      <p:nvGrpSpPr>
+        <p:cNvPr id="1" name=""/>
+        <p:cNvGrpSpPr/>
+        <p:nvPr/>
+      </p:nvGrpSpPr>
+      <p:grpSpPr>
+        <a:xfrm>
+          <a:off x="0" y="0"/>
+          <a:ext cx="0" cy="0"/>
+          <a:chOff x="0" y="0"/>
+          <a:chExt cx="0" cy="0"/>
+        </a:xfrm>
+      </p:grpSpPr>
+      <p:sp>
+        <p:nvSpPr>
+          <p:cNvPr id="2" name="Title 1"/>
+          <p:cNvSpPr>
+            <a:spLocks noGrp="1"/>
+          </p:cNvSpPr>
+          <p:nvPr>
+            <p:ph type="title"/>
+          </p:nvPr>
+        </p:nvSpPr>
+        <p:spPr/>
+        <p:txBody>
+          <a:bodyPr/>
+          <a:lstStyle/>
+          <a:p>
+            <a:r>
+              <a:rPr lang="en-US" dirty="0" smtClean="0"/>
+              <a:t>Data objects “version” differently</a:t>
+            </a:r>
+            <a:endParaRPr lang="en-US" dirty="0"/>
+          </a:p>
+        </p:txBody>
+      </p:sp>
+      <p:sp>
+        <p:nvSpPr>
+          <p:cNvPr id="3" name="Content Placeholder 2"/>
+          <p:cNvSpPr>
+            <a:spLocks noGrp="1"/>
+          </p:cNvSpPr>
+          <p:nvPr>
+            <p:ph idx="1"/>
+          </p:nvPr>
+        </p:nvSpPr>
+        <p:spPr/>
+        <p:txBody>
+          <a:bodyPr/>
+          <a:lstStyle/>
+          <a:p>
+            <a:r>
+              <a:rPr lang="en-US" dirty="0" smtClean="0"/>
+              <a:t>Books: volumes, editions, issues</a:t>
+            </a:r>
+          </a:p>
+          <a:p>
+            <a:r>
+              <a:rPr lang="en-US" dirty="0" smtClean="0"/>
+              <a:t>Software: versions, builds</a:t>
+            </a:r>
+          </a:p>
+          <a:p>
+            <a:r>
+              <a:rPr lang="en-US" dirty="0" smtClean="0"/>
+              <a:t>Datasets: are sometimes versioned, but often accrete or change gradually over time</a:t>
+            </a:r>
+          </a:p>
+          <a:p>
+            <a:r>
+              <a:rPr lang="en-US" b="1" dirty="0" smtClean="0"/>
+              <a:t>Identifier management must coincide with data management, project management, and creation of good documentation</a:t>
+            </a:r>
+            <a:endParaRPr lang="en-US" b="1" dirty="0"/>
+          </a:p>
+        </p:txBody>
+      </p:sp>
+    </p:spTree>
+    <p:extLst>
+      <p:ext uri="{BB962C8B-B14F-4D97-AF65-F5344CB8AC3E}">
+        <p14:creationId xmlns:p14="http://schemas.microsoft.com/office/powerpoint/2010/main" val="17518017"/>
+      </p:ext>
+    </p:extLst>
+  </p:cSld>
+  <p:clrMapOvr>
+    <a:masterClrMapping/>
+  </p:clrMapOvr>
 </p:sld>
 </file>
 
@@ -4406,7 +4630,7 @@
         <p:spPr>
           <a:xfrm>
             <a:off x="5443511" y="1692476"/>
-            <a:ext cx="3573087" cy="3139321"/>
+            <a:ext cx="3573087" cy="3416320"/>
           </a:xfrm>
           <a:prstGeom prst="rect">
             <a:avLst/>
@@ -4429,8 +4653,29 @@
           <a:p>
             <a:r>
               <a:rPr lang="en-US" dirty="0" smtClean="0"/>
-              <a:t>20% had content that was not accessible for review. </a:t>
-            </a:r>
+              <a:t>20% had </a:t>
+            </a:r>
+            <a:r>
+              <a:rPr lang="en-US" dirty="0" smtClean="0"/>
+              <a:t>web content </a:t>
+            </a:r>
+            <a:r>
+              <a:rPr lang="en-US" dirty="0" smtClean="0"/>
+              <a:t>that was not accessible for </a:t>
+            </a:r>
+            <a:r>
+              <a:rPr lang="en-US" dirty="0" smtClean="0"/>
+              <a:t>review</a:t>
+            </a:r>
+            <a:r>
+              <a:rPr lang="en-US" dirty="0"/>
+              <a:t> </a:t>
+            </a:r>
+            <a:r>
+              <a:rPr lang="en-US" dirty="0" smtClean="0"/>
+              <a:t>(e.g. link rot, content drift)</a:t>
+            </a:r>
+            <a:endParaRPr lang="en-US" dirty="0" smtClean="0"/>
           </a:p>
           <a:p>
             <a:endParaRPr lang="en-US" dirty="0"/>
@@ -4532,35 +4777,36 @@
           <a:p>
             <a:r>
               <a:rPr lang="en-US" dirty="0" smtClean="0"/>
-              <a:t>Qualities of an </a:t>
-            </a:r>
+              <a:t>Qualities of an ID for data curation</a:t>
+            </a:r>
+            <a:endParaRPr lang="en-US" dirty="0"/>
+          </a:p>
+        </p:txBody>
+      </p:sp>
+      <p:sp>
+        <p:nvSpPr>
+          <p:cNvPr id="3" name="Content Placeholder 2"/>
+          <p:cNvSpPr>
+            <a:spLocks noGrp="1"/>
+          </p:cNvSpPr>
+          <p:nvPr>
+            <p:ph idx="1"/>
+          </p:nvPr>
+        </p:nvSpPr>
+        <p:spPr/>
+        <p:txBody>
+          <a:bodyPr/>
+          <a:lstStyle/>
+          <a:p>
             <a:r>
               <a:rPr lang="en-US" dirty="0" smtClean="0"/>
-              <a:t>ID for data curation</a:t>
-            </a:r>
-            <a:endParaRPr lang="en-US" dirty="0"/>
-          </a:p>
-        </p:txBody>
-      </p:sp>
-      <p:sp>
-        <p:nvSpPr>
-          <p:cNvPr id="3" name="Content Placeholder 2"/>
-          <p:cNvSpPr>
-            <a:spLocks noGrp="1"/>
-          </p:cNvSpPr>
-          <p:nvPr>
-            <p:ph idx="1"/>
-          </p:nvPr>
-        </p:nvSpPr>
-        <p:spPr/>
-        <p:txBody>
-          <a:bodyPr/>
-          <a:lstStyle/>
-          <a:p>
+              <a:t>Machine </a:t>
+            </a:r>
             <a:r>
               <a:rPr lang="en-US" dirty="0" smtClean="0"/>
-              <a:t>Machine Readable</a:t>
-            </a:r>
+              <a:t>Readable</a:t>
+            </a:r>
+            <a:endParaRPr lang="en-US" dirty="0" smtClean="0"/>
           </a:p>
           <a:p>
             <a:r>
@@ -4579,7 +4825,6 @@
               <a:rPr lang="en-US" dirty="0" smtClean="0"/>
               <a:t>Resolvable</a:t>
             </a:r>
-            <a:endParaRPr lang="en-US" dirty="0" smtClean="0"/>
           </a:p>
           <a:p>
             <a:pPr marL="0" indent="0">

</xml_diff>

<commit_message>
adding identifier text and slides - almost done
</commit_message>
<xml_diff>
--- a/Day_1/Lectures/Slides/Day_1_Lecture_Identifier.pptx
+++ b/Day_1/Lectures/Slides/Day_1_Lecture_Identifier.pptx
@@ -5,7 +5,7 @@
     <p:sldMasterId id="2147483648" r:id="rId1"/>
   </p:sldMasterIdLst>
   <p:notesMasterIdLst>
-    <p:notesMasterId r:id="rId17"/>
+    <p:notesMasterId r:id="rId20"/>
   </p:notesMasterIdLst>
   <p:sldIdLst>
     <p:sldId id="256" r:id="rId2"/>
@@ -13,16 +13,19 @@
     <p:sldId id="266" r:id="rId4"/>
     <p:sldId id="263" r:id="rId5"/>
     <p:sldId id="258" r:id="rId6"/>
-    <p:sldId id="259" r:id="rId7"/>
-    <p:sldId id="260" r:id="rId8"/>
+    <p:sldId id="260" r:id="rId7"/>
+    <p:sldId id="259" r:id="rId8"/>
     <p:sldId id="261" r:id="rId9"/>
-    <p:sldId id="262" r:id="rId10"/>
+    <p:sldId id="274" r:id="rId10"/>
     <p:sldId id="265" r:id="rId11"/>
-    <p:sldId id="272" r:id="rId12"/>
-    <p:sldId id="273" r:id="rId13"/>
+    <p:sldId id="262" r:id="rId12"/>
+    <p:sldId id="272" r:id="rId13"/>
     <p:sldId id="267" r:id="rId14"/>
     <p:sldId id="269" r:id="rId15"/>
-    <p:sldId id="271" r:id="rId16"/>
+    <p:sldId id="277" r:id="rId16"/>
+    <p:sldId id="278" r:id="rId17"/>
+    <p:sldId id="271" r:id="rId18"/>
+    <p:sldId id="279" r:id="rId19"/>
   </p:sldIdLst>
   <p:sldSz cx="9144000" cy="6858000" type="screen4x3"/>
   <p:notesSz cx="6858000" cy="9144000"/>
@@ -206,7 +209,7 @@
           <a:p>
             <a:fld id="{F812B0B4-9C1E-C84F-91DC-C94EF554C0AE}" type="datetimeFigureOut">
               <a:rPr lang="en-US" smtClean="0"/>
-              <a:t>1/27/15</a:t>
+              <a:t>1/31/15</a:t>
             </a:fld>
             <a:endParaRPr lang="en-US"/>
           </a:p>
@@ -520,6 +523,15 @@
           <a:p>
             <a:r>
               <a:rPr lang="en-US" dirty="0" smtClean="0"/>
+              <a:t>Explain link rot and content drift</a:t>
+            </a:r>
+          </a:p>
+          <a:p>
+            <a:endParaRPr lang="en-US" dirty="0" smtClean="0"/>
+          </a:p>
+          <a:p>
+            <a:r>
+              <a:rPr lang="en-US" dirty="0" smtClean="0"/>
               <a:t>combination of link rot and content drift to which references to web resources included in Science, Technology, and Medicine (STM) articles are subject. W</a:t>
             </a:r>
             <a:endParaRPr lang="en-US" dirty="0"/>
@@ -700,6 +712,94 @@
 </p:notes>
 </file>
 
+<file path=ppt/notesSlides/notesSlide3.xml><?xml version="1.0" encoding="utf-8"?>
+<p:notes xmlns:a="http://schemas.openxmlformats.org/drawingml/2006/main" xmlns:r="http://schemas.openxmlformats.org/officeDocument/2006/relationships" xmlns:p="http://schemas.openxmlformats.org/presentationml/2006/main">
+  <p:cSld>
+    <p:spTree>
+      <p:nvGrpSpPr>
+        <p:cNvPr id="1" name=""/>
+        <p:cNvGrpSpPr/>
+        <p:nvPr/>
+      </p:nvGrpSpPr>
+      <p:grpSpPr>
+        <a:xfrm>
+          <a:off x="0" y="0"/>
+          <a:ext cx="0" cy="0"/>
+          <a:chOff x="0" y="0"/>
+          <a:chExt cx="0" cy="0"/>
+        </a:xfrm>
+      </p:grpSpPr>
+      <p:sp>
+        <p:nvSpPr>
+          <p:cNvPr id="2" name="Slide Image Placeholder 1"/>
+          <p:cNvSpPr>
+            <a:spLocks noGrp="1" noRot="1" noChangeAspect="1"/>
+          </p:cNvSpPr>
+          <p:nvPr>
+            <p:ph type="sldImg"/>
+          </p:nvPr>
+        </p:nvSpPr>
+        <p:spPr/>
+      </p:sp>
+      <p:sp>
+        <p:nvSpPr>
+          <p:cNvPr id="3" name="Notes Placeholder 2"/>
+          <p:cNvSpPr>
+            <a:spLocks noGrp="1"/>
+          </p:cNvSpPr>
+          <p:nvPr>
+            <p:ph type="body" idx="1"/>
+          </p:nvPr>
+        </p:nvSpPr>
+        <p:spPr/>
+        <p:txBody>
+          <a:bodyPr/>
+          <a:lstStyle/>
+          <a:p>
+            <a:r>
+              <a:rPr lang="en-US" dirty="0" smtClean="0"/>
+              <a:t>NIC – need help with this one</a:t>
+            </a:r>
+            <a:endParaRPr lang="en-US" dirty="0"/>
+          </a:p>
+        </p:txBody>
+      </p:sp>
+      <p:sp>
+        <p:nvSpPr>
+          <p:cNvPr id="4" name="Slide Number Placeholder 3"/>
+          <p:cNvSpPr>
+            <a:spLocks noGrp="1"/>
+          </p:cNvSpPr>
+          <p:nvPr>
+            <p:ph type="sldNum" sz="quarter" idx="10"/>
+          </p:nvPr>
+        </p:nvSpPr>
+        <p:spPr/>
+        <p:txBody>
+          <a:bodyPr/>
+          <a:lstStyle/>
+          <a:p>
+            <a:fld id="{D039233A-916A-5744-A9BC-3EF587F5A9D3}" type="slidenum">
+              <a:rPr lang="en-US" smtClean="0"/>
+              <a:t>16</a:t>
+            </a:fld>
+            <a:endParaRPr lang="en-US"/>
+          </a:p>
+        </p:txBody>
+      </p:sp>
+    </p:spTree>
+    <p:extLst>
+      <p:ext uri="{BB962C8B-B14F-4D97-AF65-F5344CB8AC3E}">
+        <p14:creationId xmlns:p14="http://schemas.microsoft.com/office/powerpoint/2010/main" val="291490156"/>
+      </p:ext>
+    </p:extLst>
+  </p:cSld>
+  <p:clrMapOvr>
+    <a:masterClrMapping/>
+  </p:clrMapOvr>
+</p:notes>
+</file>
+
 <file path=ppt/slideLayouts/slideLayout1.xml><?xml version="1.0" encoding="utf-8"?>
 <p:sldLayout xmlns:a="http://schemas.openxmlformats.org/drawingml/2006/main" xmlns:r="http://schemas.openxmlformats.org/officeDocument/2006/relationships" xmlns:p="http://schemas.openxmlformats.org/presentationml/2006/main" type="title" preserve="1">
   <p:cSld name="Title Slide">
@@ -881,7 +981,7 @@
           <a:p>
             <a:fld id="{9D6228D5-5F93-BB4A-964B-203967C46295}" type="datetimeFigureOut">
               <a:rPr lang="en-US" smtClean="0"/>
-              <a:t>1/27/15</a:t>
+              <a:t>1/31/15</a:t>
             </a:fld>
             <a:endParaRPr lang="en-US"/>
           </a:p>
@@ -1051,7 +1151,7 @@
           <a:p>
             <a:fld id="{9D6228D5-5F93-BB4A-964B-203967C46295}" type="datetimeFigureOut">
               <a:rPr lang="en-US" smtClean="0"/>
-              <a:t>1/27/15</a:t>
+              <a:t>1/31/15</a:t>
             </a:fld>
             <a:endParaRPr lang="en-US"/>
           </a:p>
@@ -1231,7 +1331,7 @@
           <a:p>
             <a:fld id="{9D6228D5-5F93-BB4A-964B-203967C46295}" type="datetimeFigureOut">
               <a:rPr lang="en-US" smtClean="0"/>
-              <a:t>1/27/15</a:t>
+              <a:t>1/31/15</a:t>
             </a:fld>
             <a:endParaRPr lang="en-US"/>
           </a:p>
@@ -1401,7 +1501,7 @@
           <a:p>
             <a:fld id="{9D6228D5-5F93-BB4A-964B-203967C46295}" type="datetimeFigureOut">
               <a:rPr lang="en-US" smtClean="0"/>
-              <a:t>1/27/15</a:t>
+              <a:t>1/31/15</a:t>
             </a:fld>
             <a:endParaRPr lang="en-US"/>
           </a:p>
@@ -1647,7 +1747,7 @@
           <a:p>
             <a:fld id="{9D6228D5-5F93-BB4A-964B-203967C46295}" type="datetimeFigureOut">
               <a:rPr lang="en-US" smtClean="0"/>
-              <a:t>1/27/15</a:t>
+              <a:t>1/31/15</a:t>
             </a:fld>
             <a:endParaRPr lang="en-US"/>
           </a:p>
@@ -1935,7 +2035,7 @@
           <a:p>
             <a:fld id="{9D6228D5-5F93-BB4A-964B-203967C46295}" type="datetimeFigureOut">
               <a:rPr lang="en-US" smtClean="0"/>
-              <a:t>1/27/15</a:t>
+              <a:t>1/31/15</a:t>
             </a:fld>
             <a:endParaRPr lang="en-US"/>
           </a:p>
@@ -2357,7 +2457,7 @@
           <a:p>
             <a:fld id="{9D6228D5-5F93-BB4A-964B-203967C46295}" type="datetimeFigureOut">
               <a:rPr lang="en-US" smtClean="0"/>
-              <a:t>1/27/15</a:t>
+              <a:t>1/31/15</a:t>
             </a:fld>
             <a:endParaRPr lang="en-US"/>
           </a:p>
@@ -2475,7 +2575,7 @@
           <a:p>
             <a:fld id="{9D6228D5-5F93-BB4A-964B-203967C46295}" type="datetimeFigureOut">
               <a:rPr lang="en-US" smtClean="0"/>
-              <a:t>1/27/15</a:t>
+              <a:t>1/31/15</a:t>
             </a:fld>
             <a:endParaRPr lang="en-US"/>
           </a:p>
@@ -2570,7 +2670,7 @@
           <a:p>
             <a:fld id="{9D6228D5-5F93-BB4A-964B-203967C46295}" type="datetimeFigureOut">
               <a:rPr lang="en-US" smtClean="0"/>
-              <a:t>1/27/15</a:t>
+              <a:t>1/31/15</a:t>
             </a:fld>
             <a:endParaRPr lang="en-US"/>
           </a:p>
@@ -2847,7 +2947,7 @@
           <a:p>
             <a:fld id="{9D6228D5-5F93-BB4A-964B-203967C46295}" type="datetimeFigureOut">
               <a:rPr lang="en-US" smtClean="0"/>
-              <a:t>1/27/15</a:t>
+              <a:t>1/31/15</a:t>
             </a:fld>
             <a:endParaRPr lang="en-US"/>
           </a:p>
@@ -3104,7 +3204,7 @@
           <a:p>
             <a:fld id="{9D6228D5-5F93-BB4A-964B-203967C46295}" type="datetimeFigureOut">
               <a:rPr lang="en-US" smtClean="0"/>
-              <a:t>1/27/15</a:t>
+              <a:t>1/31/15</a:t>
             </a:fld>
             <a:endParaRPr lang="en-US"/>
           </a:p>
@@ -3317,7 +3417,7 @@
           <a:p>
             <a:fld id="{9D6228D5-5F93-BB4A-964B-203967C46295}" type="datetimeFigureOut">
               <a:rPr lang="en-US" smtClean="0"/>
-              <a:t>1/27/15</a:t>
+              <a:t>1/31/15</a:t>
             </a:fld>
             <a:endParaRPr lang="en-US"/>
           </a:p>
@@ -3894,6 +3994,36 @@
           </a:prstGeom>
         </p:spPr>
       </p:pic>
+      <p:sp>
+        <p:nvSpPr>
+          <p:cNvPr id="4" name="TextBox 3"/>
+          <p:cNvSpPr txBox="1"/>
+          <p:nvPr/>
+        </p:nvSpPr>
+        <p:spPr>
+          <a:xfrm>
+            <a:off x="5367867" y="4419600"/>
+            <a:ext cx="3318933" cy="369332"/>
+          </a:xfrm>
+          <a:prstGeom prst="rect">
+            <a:avLst/>
+          </a:prstGeom>
+          <a:noFill/>
+        </p:spPr>
+        <p:txBody>
+          <a:bodyPr wrap="square" rtlCol="0">
+            <a:spAutoFit/>
+          </a:bodyPr>
+          <a:lstStyle/>
+          <a:p>
+            <a:r>
+              <a:rPr lang="en-US" dirty="0" smtClean="0"/>
+              <a:t>Reference?</a:t>
+            </a:r>
+            <a:endParaRPr lang="en-US" dirty="0"/>
+          </a:p>
+        </p:txBody>
+      </p:sp>
     </p:spTree>
     <p:extLst>
       <p:ext uri="{BB962C8B-B14F-4D97-AF65-F5344CB8AC3E}">
@@ -3908,1527 +4038,6 @@
 </file>
 
 <file path=ppt/slides/slide11.xml><?xml version="1.0" encoding="utf-8"?>
-<p:sld xmlns:a="http://schemas.openxmlformats.org/drawingml/2006/main" xmlns:r="http://schemas.openxmlformats.org/officeDocument/2006/relationships" xmlns:p="http://schemas.openxmlformats.org/presentationml/2006/main">
-  <p:cSld>
-    <p:spTree>
-      <p:nvGrpSpPr>
-        <p:cNvPr id="1" name=""/>
-        <p:cNvGrpSpPr/>
-        <p:nvPr/>
-      </p:nvGrpSpPr>
-      <p:grpSpPr>
-        <a:xfrm>
-          <a:off x="0" y="0"/>
-          <a:ext cx="0" cy="0"/>
-          <a:chOff x="0" y="0"/>
-          <a:chExt cx="0" cy="0"/>
-        </a:xfrm>
-      </p:grpSpPr>
-      <p:sp>
-        <p:nvSpPr>
-          <p:cNvPr id="2" name="Title 1"/>
-          <p:cNvSpPr>
-            <a:spLocks noGrp="1"/>
-          </p:cNvSpPr>
-          <p:nvPr>
-            <p:ph type="title"/>
-          </p:nvPr>
-        </p:nvSpPr>
-        <p:spPr/>
-        <p:txBody>
-          <a:bodyPr/>
-          <a:lstStyle/>
-          <a:p>
-            <a:r>
-              <a:rPr lang="en-US" dirty="0" smtClean="0"/>
-              <a:t>m:1</a:t>
-            </a:r>
-            <a:endParaRPr lang="en-US" dirty="0"/>
-          </a:p>
-        </p:txBody>
-      </p:sp>
-      <p:sp>
-        <p:nvSpPr>
-          <p:cNvPr id="3" name="Content Placeholder 2"/>
-          <p:cNvSpPr>
-            <a:spLocks noGrp="1"/>
-          </p:cNvSpPr>
-          <p:nvPr>
-            <p:ph idx="1"/>
-          </p:nvPr>
-        </p:nvSpPr>
-        <p:spPr/>
-        <p:txBody>
-          <a:bodyPr/>
-          <a:lstStyle/>
-          <a:p>
-            <a:r>
-              <a:rPr lang="en-US" dirty="0" smtClean="0"/>
-              <a:t>One resource can have many DOIs</a:t>
-            </a:r>
-          </a:p>
-          <a:p>
-            <a:r>
-              <a:rPr lang="en-US" dirty="0" smtClean="0"/>
-              <a:t>This points us to a key challenge….</a:t>
-            </a:r>
-            <a:endParaRPr lang="en-US" dirty="0"/>
-          </a:p>
-        </p:txBody>
-      </p:sp>
-    </p:spTree>
-    <p:extLst>
-      <p:ext uri="{BB962C8B-B14F-4D97-AF65-F5344CB8AC3E}">
-        <p14:creationId xmlns:p14="http://schemas.microsoft.com/office/powerpoint/2010/main" val="2022625081"/>
-      </p:ext>
-    </p:extLst>
-  </p:cSld>
-  <p:clrMapOvr>
-    <a:masterClrMapping/>
-  </p:clrMapOvr>
-</p:sld>
-</file>
-
-<file path=ppt/slides/slide12.xml><?xml version="1.0" encoding="utf-8"?>
-<p:sld xmlns:a="http://schemas.openxmlformats.org/drawingml/2006/main" xmlns:r="http://schemas.openxmlformats.org/officeDocument/2006/relationships" xmlns:p="http://schemas.openxmlformats.org/presentationml/2006/main">
-  <p:cSld>
-    <p:spTree>
-      <p:nvGrpSpPr>
-        <p:cNvPr id="1" name=""/>
-        <p:cNvGrpSpPr/>
-        <p:nvPr/>
-      </p:nvGrpSpPr>
-      <p:grpSpPr>
-        <a:xfrm>
-          <a:off x="0" y="0"/>
-          <a:ext cx="0" cy="0"/>
-          <a:chOff x="0" y="0"/>
-          <a:chExt cx="0" cy="0"/>
-        </a:xfrm>
-      </p:grpSpPr>
-      <p:sp>
-        <p:nvSpPr>
-          <p:cNvPr id="2" name="Title 1"/>
-          <p:cNvSpPr>
-            <a:spLocks noGrp="1"/>
-          </p:cNvSpPr>
-          <p:nvPr>
-            <p:ph type="ctrTitle"/>
-          </p:nvPr>
-        </p:nvSpPr>
-        <p:spPr/>
-        <p:txBody>
-          <a:bodyPr/>
-          <a:lstStyle/>
-          <a:p>
-            <a:r>
-              <a:rPr lang="en-US" dirty="0" smtClean="0"/>
-              <a:t>Challenges</a:t>
-            </a:r>
-            <a:endParaRPr lang="en-US" dirty="0"/>
-          </a:p>
-        </p:txBody>
-      </p:sp>
-      <p:sp>
-        <p:nvSpPr>
-          <p:cNvPr id="3" name="Subtitle 2"/>
-          <p:cNvSpPr>
-            <a:spLocks noGrp="1"/>
-          </p:cNvSpPr>
-          <p:nvPr>
-            <p:ph type="subTitle" idx="1"/>
-          </p:nvPr>
-        </p:nvSpPr>
-        <p:spPr/>
-        <p:txBody>
-          <a:bodyPr/>
-          <a:lstStyle/>
-          <a:p>
-            <a:endParaRPr lang="en-US"/>
-          </a:p>
-        </p:txBody>
-      </p:sp>
-    </p:spTree>
-    <p:extLst>
-      <p:ext uri="{BB962C8B-B14F-4D97-AF65-F5344CB8AC3E}">
-        <p14:creationId xmlns:p14="http://schemas.microsoft.com/office/powerpoint/2010/main" val="357283254"/>
-      </p:ext>
-    </p:extLst>
-  </p:cSld>
-  <p:clrMapOvr>
-    <a:masterClrMapping/>
-  </p:clrMapOvr>
-</p:sld>
-</file>
-
-<file path=ppt/slides/slide13.xml><?xml version="1.0" encoding="utf-8"?>
-<p:sld xmlns:a="http://schemas.openxmlformats.org/drawingml/2006/main" xmlns:r="http://schemas.openxmlformats.org/officeDocument/2006/relationships" xmlns:p="http://schemas.openxmlformats.org/presentationml/2006/main">
-  <p:cSld>
-    <p:spTree>
-      <p:nvGrpSpPr>
-        <p:cNvPr id="1" name=""/>
-        <p:cNvGrpSpPr/>
-        <p:nvPr/>
-      </p:nvGrpSpPr>
-      <p:grpSpPr>
-        <a:xfrm>
-          <a:off x="0" y="0"/>
-          <a:ext cx="0" cy="0"/>
-          <a:chOff x="0" y="0"/>
-          <a:chExt cx="0" cy="0"/>
-        </a:xfrm>
-      </p:grpSpPr>
-      <p:sp>
-        <p:nvSpPr>
-          <p:cNvPr id="2" name="Title 1"/>
-          <p:cNvSpPr>
-            <a:spLocks noGrp="1"/>
-          </p:cNvSpPr>
-          <p:nvPr>
-            <p:ph type="title"/>
-          </p:nvPr>
-        </p:nvSpPr>
-        <p:spPr/>
-        <p:txBody>
-          <a:bodyPr>
-            <a:normAutofit fontScale="90000"/>
-          </a:bodyPr>
-          <a:lstStyle/>
-          <a:p>
-            <a:r>
-              <a:rPr lang="en-US" dirty="0" smtClean="0"/>
-              <a:t>Qualities of an ID for data curation</a:t>
-            </a:r>
-            <a:endParaRPr lang="en-US" dirty="0"/>
-          </a:p>
-        </p:txBody>
-      </p:sp>
-      <p:sp>
-        <p:nvSpPr>
-          <p:cNvPr id="3" name="Content Placeholder 2"/>
-          <p:cNvSpPr>
-            <a:spLocks noGrp="1"/>
-          </p:cNvSpPr>
-          <p:nvPr>
-            <p:ph idx="1"/>
-          </p:nvPr>
-        </p:nvSpPr>
-        <p:spPr/>
-        <p:txBody>
-          <a:bodyPr/>
-          <a:lstStyle/>
-          <a:p>
-            <a:r>
-              <a:rPr lang="en-US" dirty="0" smtClean="0"/>
-              <a:t>Machine Readable</a:t>
-            </a:r>
-          </a:p>
-          <a:p>
-            <a:r>
-              <a:rPr lang="en-US" dirty="0" smtClean="0"/>
-              <a:t>Unique</a:t>
-            </a:r>
-          </a:p>
-          <a:p>
-            <a:r>
-              <a:rPr lang="en-US" b="1" dirty="0" smtClean="0"/>
-              <a:t>Persistent</a:t>
-            </a:r>
-          </a:p>
-          <a:p>
-            <a:r>
-              <a:rPr lang="en-US" b="1" dirty="0" smtClean="0"/>
-              <a:t>Resolvable</a:t>
-            </a:r>
-          </a:p>
-          <a:p>
-            <a:pPr marL="0" indent="0">
-              <a:buNone/>
-            </a:pPr>
-            <a:endParaRPr lang="en-US" dirty="0" smtClean="0"/>
-          </a:p>
-        </p:txBody>
-      </p:sp>
-    </p:spTree>
-    <p:extLst>
-      <p:ext uri="{BB962C8B-B14F-4D97-AF65-F5344CB8AC3E}">
-        <p14:creationId xmlns:p14="http://schemas.microsoft.com/office/powerpoint/2010/main" val="1631999202"/>
-      </p:ext>
-    </p:extLst>
-  </p:cSld>
-  <p:clrMapOvr>
-    <a:masterClrMapping/>
-  </p:clrMapOvr>
-  <p:timing>
-    <p:tnLst>
-      <p:par>
-        <p:cTn xmlns:p14="http://schemas.microsoft.com/office/powerpoint/2010/main" id="1" dur="indefinite" restart="never" nodeType="tmRoot"/>
-      </p:par>
-    </p:tnLst>
-  </p:timing>
-</p:sld>
-</file>
-
-<file path=ppt/slides/slide14.xml><?xml version="1.0" encoding="utf-8"?>
-<p:sld xmlns:a="http://schemas.openxmlformats.org/drawingml/2006/main" xmlns:r="http://schemas.openxmlformats.org/officeDocument/2006/relationships" xmlns:p="http://schemas.openxmlformats.org/presentationml/2006/main">
-  <p:cSld>
-    <p:spTree>
-      <p:nvGrpSpPr>
-        <p:cNvPr id="1" name=""/>
-        <p:cNvGrpSpPr/>
-        <p:nvPr/>
-      </p:nvGrpSpPr>
-      <p:grpSpPr>
-        <a:xfrm>
-          <a:off x="0" y="0"/>
-          <a:ext cx="0" cy="0"/>
-          <a:chOff x="0" y="0"/>
-          <a:chExt cx="0" cy="0"/>
-        </a:xfrm>
-      </p:grpSpPr>
-      <p:sp>
-        <p:nvSpPr>
-          <p:cNvPr id="2" name="Title 1"/>
-          <p:cNvSpPr>
-            <a:spLocks noGrp="1"/>
-          </p:cNvSpPr>
-          <p:nvPr>
-            <p:ph type="title"/>
-          </p:nvPr>
-        </p:nvSpPr>
-        <p:spPr/>
-        <p:txBody>
-          <a:bodyPr/>
-          <a:lstStyle/>
-          <a:p>
-            <a:r>
-              <a:rPr lang="en-US" dirty="0" smtClean="0"/>
-              <a:t>An ID alone isn’t enough</a:t>
-            </a:r>
-            <a:endParaRPr lang="en-US" dirty="0"/>
-          </a:p>
-        </p:txBody>
-      </p:sp>
-      <p:sp>
-        <p:nvSpPr>
-          <p:cNvPr id="3" name="Content Placeholder 2"/>
-          <p:cNvSpPr>
-            <a:spLocks noGrp="1"/>
-          </p:cNvSpPr>
-          <p:nvPr>
-            <p:ph idx="1"/>
-          </p:nvPr>
-        </p:nvSpPr>
-        <p:spPr/>
-        <p:txBody>
-          <a:bodyPr/>
-          <a:lstStyle/>
-          <a:p>
-            <a:r>
-              <a:rPr lang="en-US" dirty="0" smtClean="0"/>
-              <a:t>ID’s are pointers – they need to point to something</a:t>
-            </a:r>
-          </a:p>
-          <a:p>
-            <a:endParaRPr lang="en-US" dirty="0" smtClean="0"/>
-          </a:p>
-          <a:p>
-            <a:r>
-              <a:rPr lang="en-US" dirty="0" smtClean="0"/>
-              <a:t>Just as an address won’t prevent a house from being demolished or remodeled, an ID will not ward off “content drift” or prevent data from being deleted</a:t>
-            </a:r>
-          </a:p>
-          <a:p>
-            <a:endParaRPr lang="en-US" dirty="0"/>
-          </a:p>
-        </p:txBody>
-      </p:sp>
-    </p:spTree>
-    <p:extLst>
-      <p:ext uri="{BB962C8B-B14F-4D97-AF65-F5344CB8AC3E}">
-        <p14:creationId xmlns:p14="http://schemas.microsoft.com/office/powerpoint/2010/main" val="1798583032"/>
-      </p:ext>
-    </p:extLst>
-  </p:cSld>
-  <p:clrMapOvr>
-    <a:masterClrMapping/>
-  </p:clrMapOvr>
-</p:sld>
-</file>
-
-<file path=ppt/slides/slide15.xml><?xml version="1.0" encoding="utf-8"?>
-<p:sld xmlns:a="http://schemas.openxmlformats.org/drawingml/2006/main" xmlns:r="http://schemas.openxmlformats.org/officeDocument/2006/relationships" xmlns:p="http://schemas.openxmlformats.org/presentationml/2006/main">
-  <p:cSld>
-    <p:spTree>
-      <p:nvGrpSpPr>
-        <p:cNvPr id="1" name=""/>
-        <p:cNvGrpSpPr/>
-        <p:nvPr/>
-      </p:nvGrpSpPr>
-      <p:grpSpPr>
-        <a:xfrm>
-          <a:off x="0" y="0"/>
-          <a:ext cx="0" cy="0"/>
-          <a:chOff x="0" y="0"/>
-          <a:chExt cx="0" cy="0"/>
-        </a:xfrm>
-      </p:grpSpPr>
-      <p:sp>
-        <p:nvSpPr>
-          <p:cNvPr id="2" name="Title 1"/>
-          <p:cNvSpPr>
-            <a:spLocks noGrp="1"/>
-          </p:cNvSpPr>
-          <p:nvPr>
-            <p:ph type="title"/>
-          </p:nvPr>
-        </p:nvSpPr>
-        <p:spPr/>
-        <p:txBody>
-          <a:bodyPr/>
-          <a:lstStyle/>
-          <a:p>
-            <a:r>
-              <a:rPr lang="en-US" dirty="0" smtClean="0"/>
-              <a:t>Data objects “version” differently</a:t>
-            </a:r>
-            <a:endParaRPr lang="en-US" dirty="0"/>
-          </a:p>
-        </p:txBody>
-      </p:sp>
-      <p:sp>
-        <p:nvSpPr>
-          <p:cNvPr id="3" name="Content Placeholder 2"/>
-          <p:cNvSpPr>
-            <a:spLocks noGrp="1"/>
-          </p:cNvSpPr>
-          <p:nvPr>
-            <p:ph idx="1"/>
-          </p:nvPr>
-        </p:nvSpPr>
-        <p:spPr/>
-        <p:txBody>
-          <a:bodyPr/>
-          <a:lstStyle/>
-          <a:p>
-            <a:r>
-              <a:rPr lang="en-US" dirty="0" smtClean="0"/>
-              <a:t>Books: volumes, editions, issues</a:t>
-            </a:r>
-          </a:p>
-          <a:p>
-            <a:r>
-              <a:rPr lang="en-US" dirty="0" smtClean="0"/>
-              <a:t>Software: versions, builds</a:t>
-            </a:r>
-          </a:p>
-          <a:p>
-            <a:r>
-              <a:rPr lang="en-US" dirty="0" smtClean="0"/>
-              <a:t>Datasets: are sometimes versioned, but often accrete or change gradually over time</a:t>
-            </a:r>
-          </a:p>
-          <a:p>
-            <a:r>
-              <a:rPr lang="en-US" b="1" dirty="0" smtClean="0"/>
-              <a:t>Identifier management must coincide with data management, project management, and creation of good documentation</a:t>
-            </a:r>
-            <a:endParaRPr lang="en-US" b="1" dirty="0"/>
-          </a:p>
-        </p:txBody>
-      </p:sp>
-    </p:spTree>
-    <p:extLst>
-      <p:ext uri="{BB962C8B-B14F-4D97-AF65-F5344CB8AC3E}">
-        <p14:creationId xmlns:p14="http://schemas.microsoft.com/office/powerpoint/2010/main" val="17518017"/>
-      </p:ext>
-    </p:extLst>
-  </p:cSld>
-  <p:clrMapOvr>
-    <a:masterClrMapping/>
-  </p:clrMapOvr>
-</p:sld>
-</file>
-
-<file path=ppt/slides/slide2.xml><?xml version="1.0" encoding="utf-8"?>
-<p:sld xmlns:a="http://schemas.openxmlformats.org/drawingml/2006/main" xmlns:r="http://schemas.openxmlformats.org/officeDocument/2006/relationships" xmlns:p="http://schemas.openxmlformats.org/presentationml/2006/main">
-  <p:cSld>
-    <p:spTree>
-      <p:nvGrpSpPr>
-        <p:cNvPr id="1" name=""/>
-        <p:cNvGrpSpPr/>
-        <p:nvPr/>
-      </p:nvGrpSpPr>
-      <p:grpSpPr>
-        <a:xfrm>
-          <a:off x="0" y="0"/>
-          <a:ext cx="0" cy="0"/>
-          <a:chOff x="0" y="0"/>
-          <a:chExt cx="0" cy="0"/>
-        </a:xfrm>
-      </p:grpSpPr>
-      <p:sp>
-        <p:nvSpPr>
-          <p:cNvPr id="2" name="Title 1"/>
-          <p:cNvSpPr>
-            <a:spLocks noGrp="1"/>
-          </p:cNvSpPr>
-          <p:nvPr>
-            <p:ph type="title"/>
-          </p:nvPr>
-        </p:nvSpPr>
-        <p:spPr/>
-        <p:txBody>
-          <a:bodyPr/>
-          <a:lstStyle/>
-          <a:p>
-            <a:r>
-              <a:rPr lang="en-US" dirty="0" smtClean="0"/>
-              <a:t>What is an identifier? </a:t>
-            </a:r>
-            <a:endParaRPr lang="en-US" dirty="0"/>
-          </a:p>
-        </p:txBody>
-      </p:sp>
-      <p:sp>
-        <p:nvSpPr>
-          <p:cNvPr id="3" name="Content Placeholder 2"/>
-          <p:cNvSpPr>
-            <a:spLocks noGrp="1"/>
-          </p:cNvSpPr>
-          <p:nvPr>
-            <p:ph idx="1"/>
-          </p:nvPr>
-        </p:nvSpPr>
-        <p:spPr/>
-        <p:txBody>
-          <a:bodyPr/>
-          <a:lstStyle/>
-          <a:p>
-            <a:r>
-              <a:rPr lang="en-US" dirty="0" smtClean="0"/>
-              <a:t>“</a:t>
-            </a:r>
-            <a:r>
-              <a:rPr lang="en-US" i="1" dirty="0" smtClean="0"/>
-              <a:t>a name that identifies either a unique object or a unique class of objects”</a:t>
-            </a:r>
-          </a:p>
-        </p:txBody>
-      </p:sp>
-    </p:spTree>
-    <p:extLst>
-      <p:ext uri="{BB962C8B-B14F-4D97-AF65-F5344CB8AC3E}">
-        <p14:creationId xmlns:p14="http://schemas.microsoft.com/office/powerpoint/2010/main" val="5531785"/>
-      </p:ext>
-    </p:extLst>
-  </p:cSld>
-  <p:clrMapOvr>
-    <a:masterClrMapping/>
-  </p:clrMapOvr>
-  <p:timing>
-    <p:tnLst>
-      <p:par>
-        <p:cTn xmlns:p14="http://schemas.microsoft.com/office/powerpoint/2010/main" id="1" dur="indefinite" restart="never" nodeType="tmRoot"/>
-      </p:par>
-    </p:tnLst>
-  </p:timing>
-</p:sld>
-</file>
-
-<file path=ppt/slides/slide3.xml><?xml version="1.0" encoding="utf-8"?>
-<p:sld xmlns:a="http://schemas.openxmlformats.org/drawingml/2006/main" xmlns:r="http://schemas.openxmlformats.org/officeDocument/2006/relationships" xmlns:p="http://schemas.openxmlformats.org/presentationml/2006/main">
-  <p:cSld>
-    <p:spTree>
-      <p:nvGrpSpPr>
-        <p:cNvPr id="1" name=""/>
-        <p:cNvGrpSpPr/>
-        <p:nvPr/>
-      </p:nvGrpSpPr>
-      <p:grpSpPr>
-        <a:xfrm>
-          <a:off x="0" y="0"/>
-          <a:ext cx="0" cy="0"/>
-          <a:chOff x="0" y="0"/>
-          <a:chExt cx="0" cy="0"/>
-        </a:xfrm>
-      </p:grpSpPr>
-      <p:pic>
-        <p:nvPicPr>
-          <p:cNvPr id="9" name="Picture 8" descr="identifier.tiff"/>
-          <p:cNvPicPr>
-            <a:picLocks noChangeAspect="1"/>
-          </p:cNvPicPr>
-          <p:nvPr/>
-        </p:nvPicPr>
-        <p:blipFill>
-          <a:blip r:embed="rId2">
-            <a:extLst>
-              <a:ext uri="{28A0092B-C50C-407E-A947-70E740481C1C}">
-                <a14:useLocalDpi xmlns:a14="http://schemas.microsoft.com/office/drawing/2010/main" val="0"/>
-              </a:ext>
-            </a:extLst>
-          </a:blip>
-          <a:stretch>
-            <a:fillRect/>
-          </a:stretch>
-        </p:blipFill>
-        <p:spPr>
-          <a:xfrm>
-            <a:off x="0" y="2327662"/>
-            <a:ext cx="9144000" cy="3371099"/>
-          </a:xfrm>
-          <a:prstGeom prst="rect">
-            <a:avLst/>
-          </a:prstGeom>
-        </p:spPr>
-      </p:pic>
-      <p:sp>
-        <p:nvSpPr>
-          <p:cNvPr id="2" name="Title 1"/>
-          <p:cNvSpPr>
-            <a:spLocks noGrp="1"/>
-          </p:cNvSpPr>
-          <p:nvPr>
-            <p:ph type="title"/>
-          </p:nvPr>
-        </p:nvSpPr>
-        <p:spPr/>
-        <p:txBody>
-          <a:bodyPr/>
-          <a:lstStyle/>
-          <a:p>
-            <a:r>
-              <a:rPr lang="en-US" dirty="0" smtClean="0"/>
-              <a:t>Identifiers are everywhere</a:t>
-            </a:r>
-            <a:endParaRPr lang="en-US" dirty="0"/>
-          </a:p>
-        </p:txBody>
-      </p:sp>
-      <p:pic>
-        <p:nvPicPr>
-          <p:cNvPr id="7" name="Picture 6" descr="640px-Issn-barcode-explained.png"/>
-          <p:cNvPicPr>
-            <a:picLocks noChangeAspect="1"/>
-          </p:cNvPicPr>
-          <p:nvPr/>
-        </p:nvPicPr>
-        <p:blipFill>
-          <a:blip r:embed="rId3">
-            <a:extLst>
-              <a:ext uri="{28A0092B-C50C-407E-A947-70E740481C1C}">
-                <a14:useLocalDpi xmlns:a14="http://schemas.microsoft.com/office/drawing/2010/main" val="0"/>
-              </a:ext>
-            </a:extLst>
-          </a:blip>
-          <a:stretch>
-            <a:fillRect/>
-          </a:stretch>
-        </p:blipFill>
-        <p:spPr>
-          <a:xfrm>
-            <a:off x="4402668" y="1811189"/>
-            <a:ext cx="2709333" cy="1744132"/>
-          </a:xfrm>
-          <a:prstGeom prst="rect">
-            <a:avLst/>
-          </a:prstGeom>
-        </p:spPr>
-      </p:pic>
-      <p:pic>
-        <p:nvPicPr>
-          <p:cNvPr id="8" name="Picture 7" descr="p_unit.jpg"/>
-          <p:cNvPicPr>
-            <a:picLocks noChangeAspect="1"/>
-          </p:cNvPicPr>
-          <p:nvPr/>
-        </p:nvPicPr>
-        <p:blipFill>
-          <a:blip r:embed="rId4">
-            <a:extLst>
-              <a:ext uri="{28A0092B-C50C-407E-A947-70E740481C1C}">
-                <a14:useLocalDpi xmlns:a14="http://schemas.microsoft.com/office/drawing/2010/main" val="0"/>
-              </a:ext>
-            </a:extLst>
-          </a:blip>
-          <a:stretch>
-            <a:fillRect/>
-          </a:stretch>
-        </p:blipFill>
-        <p:spPr>
-          <a:xfrm>
-            <a:off x="1185332" y="1605964"/>
-            <a:ext cx="2578560" cy="2154581"/>
-          </a:xfrm>
-          <a:prstGeom prst="rect">
-            <a:avLst/>
-          </a:prstGeom>
-        </p:spPr>
-      </p:pic>
-    </p:spTree>
-    <p:extLst>
-      <p:ext uri="{BB962C8B-B14F-4D97-AF65-F5344CB8AC3E}">
-        <p14:creationId xmlns:p14="http://schemas.microsoft.com/office/powerpoint/2010/main" val="1089484448"/>
-      </p:ext>
-    </p:extLst>
-  </p:cSld>
-  <p:clrMapOvr>
-    <a:masterClrMapping/>
-  </p:clrMapOvr>
-</p:sld>
-</file>
-
-<file path=ppt/slides/slide4.xml><?xml version="1.0" encoding="utf-8"?>
-<p:sld xmlns:a="http://schemas.openxmlformats.org/drawingml/2006/main" xmlns:r="http://schemas.openxmlformats.org/officeDocument/2006/relationships" xmlns:p="http://schemas.openxmlformats.org/presentationml/2006/main">
-  <p:cSld>
-    <p:spTree>
-      <p:nvGrpSpPr>
-        <p:cNvPr id="1" name=""/>
-        <p:cNvGrpSpPr/>
-        <p:nvPr/>
-      </p:nvGrpSpPr>
-      <p:grpSpPr>
-        <a:xfrm>
-          <a:off x="0" y="0"/>
-          <a:ext cx="0" cy="0"/>
-          <a:chOff x="0" y="0"/>
-          <a:chExt cx="0" cy="0"/>
-        </a:xfrm>
-      </p:grpSpPr>
-      <p:sp>
-        <p:nvSpPr>
-          <p:cNvPr id="2" name="Title 1"/>
-          <p:cNvSpPr>
-            <a:spLocks noGrp="1"/>
-          </p:cNvSpPr>
-          <p:nvPr>
-            <p:ph type="title"/>
-          </p:nvPr>
-        </p:nvSpPr>
-        <p:spPr/>
-        <p:txBody>
-          <a:bodyPr>
-            <a:normAutofit fontScale="90000"/>
-          </a:bodyPr>
-          <a:lstStyle/>
-          <a:p>
-            <a:r>
-              <a:rPr lang="en-US" dirty="0" smtClean="0"/>
-              <a:t>Why IDs matter for data curation?</a:t>
-            </a:r>
-            <a:endParaRPr lang="en-US" dirty="0"/>
-          </a:p>
-        </p:txBody>
-      </p:sp>
-      <p:sp>
-        <p:nvSpPr>
-          <p:cNvPr id="4" name="Rectangle 3"/>
-          <p:cNvSpPr/>
-          <p:nvPr/>
-        </p:nvSpPr>
-        <p:spPr>
-          <a:xfrm>
-            <a:off x="5443511" y="1692476"/>
-            <a:ext cx="3573087" cy="3416320"/>
-          </a:xfrm>
-          <a:prstGeom prst="rect">
-            <a:avLst/>
-          </a:prstGeom>
-        </p:spPr>
-        <p:txBody>
-          <a:bodyPr wrap="square">
-            <a:spAutoFit/>
-          </a:bodyPr>
-          <a:lstStyle/>
-          <a:p>
-            <a:r>
-              <a:rPr lang="en-US" dirty="0" smtClean="0"/>
-              <a:t>Test corpus: 3.5 million scholarly articles published 1997-2012</a:t>
-            </a:r>
-          </a:p>
-          <a:p>
-            <a:endParaRPr lang="en-US" dirty="0"/>
-          </a:p>
-          <a:p>
-            <a:r>
-              <a:rPr lang="en-US" dirty="0" smtClean="0"/>
-              <a:t>20% had </a:t>
-            </a:r>
-            <a:r>
-              <a:rPr lang="en-US" dirty="0" smtClean="0"/>
-              <a:t>web content </a:t>
-            </a:r>
-            <a:r>
-              <a:rPr lang="en-US" dirty="0" smtClean="0"/>
-              <a:t>that was not accessible for </a:t>
-            </a:r>
-            <a:r>
-              <a:rPr lang="en-US" dirty="0" smtClean="0"/>
-              <a:t>review</a:t>
-            </a:r>
-            <a:r>
-              <a:rPr lang="en-US" dirty="0"/>
-              <a:t> </a:t>
-            </a:r>
-            <a:r>
-              <a:rPr lang="en-US" dirty="0" smtClean="0"/>
-              <a:t>(e.g. link rot, content drift)</a:t>
-            </a:r>
-            <a:endParaRPr lang="en-US" dirty="0" smtClean="0"/>
-          </a:p>
-          <a:p>
-            <a:endParaRPr lang="en-US" dirty="0"/>
-          </a:p>
-          <a:p>
-            <a:r>
-              <a:rPr lang="en-US" dirty="0" smtClean="0"/>
-              <a:t>If data are playing a role of evidence… we need to make sure that they are accessible for the long-term</a:t>
-            </a:r>
-          </a:p>
-          <a:p>
-            <a:endParaRPr lang="en-US" dirty="0"/>
-          </a:p>
-        </p:txBody>
-      </p:sp>
-      <p:pic>
-        <p:nvPicPr>
-          <p:cNvPr id="5" name="Picture 4" descr="Screen Shot 2014-12-29 at 2.29.33 PM.png"/>
-          <p:cNvPicPr>
-            <a:picLocks noChangeAspect="1"/>
-          </p:cNvPicPr>
-          <p:nvPr/>
-        </p:nvPicPr>
-        <p:blipFill>
-          <a:blip r:embed="rId3">
-            <a:extLst>
-              <a:ext uri="{28A0092B-C50C-407E-A947-70E740481C1C}">
-                <a14:useLocalDpi xmlns:a14="http://schemas.microsoft.com/office/drawing/2010/main" val="0"/>
-              </a:ext>
-            </a:extLst>
-          </a:blip>
-          <a:stretch>
-            <a:fillRect/>
-          </a:stretch>
-        </p:blipFill>
-        <p:spPr>
-          <a:xfrm>
-            <a:off x="216468" y="1692476"/>
-            <a:ext cx="4969887" cy="2343176"/>
-          </a:xfrm>
-          <a:prstGeom prst="rect">
-            <a:avLst/>
-          </a:prstGeom>
-          <a:effectLst>
-            <a:outerShdw blurRad="50800" dist="38100" dir="2700000" algn="tl" rotWithShape="0">
-              <a:prstClr val="black">
-                <a:alpha val="40000"/>
-              </a:prstClr>
-            </a:outerShdw>
-          </a:effectLst>
-        </p:spPr>
-      </p:pic>
-    </p:spTree>
-    <p:extLst>
-      <p:ext uri="{BB962C8B-B14F-4D97-AF65-F5344CB8AC3E}">
-        <p14:creationId xmlns:p14="http://schemas.microsoft.com/office/powerpoint/2010/main" val="3160640283"/>
-      </p:ext>
-    </p:extLst>
-  </p:cSld>
-  <p:clrMapOvr>
-    <a:masterClrMapping/>
-  </p:clrMapOvr>
-</p:sld>
-</file>
-
-<file path=ppt/slides/slide5.xml><?xml version="1.0" encoding="utf-8"?>
-<p:sld xmlns:a="http://schemas.openxmlformats.org/drawingml/2006/main" xmlns:r="http://schemas.openxmlformats.org/officeDocument/2006/relationships" xmlns:p="http://schemas.openxmlformats.org/presentationml/2006/main">
-  <p:cSld>
-    <p:spTree>
-      <p:nvGrpSpPr>
-        <p:cNvPr id="1" name=""/>
-        <p:cNvGrpSpPr/>
-        <p:nvPr/>
-      </p:nvGrpSpPr>
-      <p:grpSpPr>
-        <a:xfrm>
-          <a:off x="0" y="0"/>
-          <a:ext cx="0" cy="0"/>
-          <a:chOff x="0" y="0"/>
-          <a:chExt cx="0" cy="0"/>
-        </a:xfrm>
-      </p:grpSpPr>
-      <p:sp>
-        <p:nvSpPr>
-          <p:cNvPr id="2" name="Title 1"/>
-          <p:cNvSpPr>
-            <a:spLocks noGrp="1"/>
-          </p:cNvSpPr>
-          <p:nvPr>
-            <p:ph type="title"/>
-          </p:nvPr>
-        </p:nvSpPr>
-        <p:spPr/>
-        <p:txBody>
-          <a:bodyPr>
-            <a:normAutofit fontScale="90000"/>
-          </a:bodyPr>
-          <a:lstStyle/>
-          <a:p>
-            <a:r>
-              <a:rPr lang="en-US" dirty="0" smtClean="0"/>
-              <a:t>Qualities of an ID for data curation</a:t>
-            </a:r>
-            <a:endParaRPr lang="en-US" dirty="0"/>
-          </a:p>
-        </p:txBody>
-      </p:sp>
-      <p:sp>
-        <p:nvSpPr>
-          <p:cNvPr id="3" name="Content Placeholder 2"/>
-          <p:cNvSpPr>
-            <a:spLocks noGrp="1"/>
-          </p:cNvSpPr>
-          <p:nvPr>
-            <p:ph idx="1"/>
-          </p:nvPr>
-        </p:nvSpPr>
-        <p:spPr/>
-        <p:txBody>
-          <a:bodyPr/>
-          <a:lstStyle/>
-          <a:p>
-            <a:r>
-              <a:rPr lang="en-US" dirty="0" smtClean="0"/>
-              <a:t>Machine </a:t>
-            </a:r>
-            <a:r>
-              <a:rPr lang="en-US" dirty="0" smtClean="0"/>
-              <a:t>Readable</a:t>
-            </a:r>
-            <a:endParaRPr lang="en-US" dirty="0" smtClean="0"/>
-          </a:p>
-          <a:p>
-            <a:r>
-              <a:rPr lang="en-US" dirty="0" smtClean="0"/>
-              <a:t>Unique</a:t>
-            </a:r>
-          </a:p>
-          <a:p>
-            <a:r>
-              <a:rPr lang="en-US" dirty="0" smtClean="0"/>
-              <a:t>Persistent</a:t>
-            </a:r>
-          </a:p>
-          <a:p>
-            <a:r>
-              <a:rPr lang="en-US" dirty="0" smtClean="0"/>
-              <a:t>Resolvable</a:t>
-            </a:r>
-          </a:p>
-          <a:p>
-            <a:pPr marL="0" indent="0">
-              <a:buNone/>
-            </a:pPr>
-            <a:endParaRPr lang="en-US" dirty="0" smtClean="0"/>
-          </a:p>
-        </p:txBody>
-      </p:sp>
-    </p:spTree>
-    <p:extLst>
-      <p:ext uri="{BB962C8B-B14F-4D97-AF65-F5344CB8AC3E}">
-        <p14:creationId xmlns:p14="http://schemas.microsoft.com/office/powerpoint/2010/main" val="2369558882"/>
-      </p:ext>
-    </p:extLst>
-  </p:cSld>
-  <p:clrMapOvr>
-    <a:masterClrMapping/>
-  </p:clrMapOvr>
-  <p:timing>
-    <p:tnLst>
-      <p:par>
-        <p:cTn xmlns:p14="http://schemas.microsoft.com/office/powerpoint/2010/main" id="1" dur="indefinite" restart="never" nodeType="tmRoot"/>
-      </p:par>
-    </p:tnLst>
-  </p:timing>
-</p:sld>
-</file>
-
-<file path=ppt/slides/slide6.xml><?xml version="1.0" encoding="utf-8"?>
-<p:sld xmlns:a="http://schemas.openxmlformats.org/drawingml/2006/main" xmlns:r="http://schemas.openxmlformats.org/officeDocument/2006/relationships" xmlns:p="http://schemas.openxmlformats.org/presentationml/2006/main">
-  <p:cSld>
-    <p:spTree>
-      <p:nvGrpSpPr>
-        <p:cNvPr id="1" name=""/>
-        <p:cNvGrpSpPr/>
-        <p:nvPr/>
-      </p:nvGrpSpPr>
-      <p:grpSpPr>
-        <a:xfrm>
-          <a:off x="0" y="0"/>
-          <a:ext cx="0" cy="0"/>
-          <a:chOff x="0" y="0"/>
-          <a:chExt cx="0" cy="0"/>
-        </a:xfrm>
-      </p:grpSpPr>
-      <p:sp>
-        <p:nvSpPr>
-          <p:cNvPr id="2" name="Title 1"/>
-          <p:cNvSpPr>
-            <a:spLocks noGrp="1"/>
-          </p:cNvSpPr>
-          <p:nvPr>
-            <p:ph type="title"/>
-          </p:nvPr>
-        </p:nvSpPr>
-        <p:spPr/>
-        <p:txBody>
-          <a:bodyPr/>
-          <a:lstStyle/>
-          <a:p>
-            <a:r>
-              <a:rPr lang="en-US" dirty="0" smtClean="0"/>
-              <a:t>Values of different ID schemes</a:t>
-            </a:r>
-            <a:endParaRPr lang="en-US" dirty="0"/>
-          </a:p>
-        </p:txBody>
-      </p:sp>
-      <p:sp>
-        <p:nvSpPr>
-          <p:cNvPr id="3" name="Content Placeholder 2"/>
-          <p:cNvSpPr>
-            <a:spLocks noGrp="1"/>
-          </p:cNvSpPr>
-          <p:nvPr>
-            <p:ph idx="1"/>
-          </p:nvPr>
-        </p:nvSpPr>
-        <p:spPr>
-          <a:xfrm>
-            <a:off x="457200" y="1880792"/>
-            <a:ext cx="8229600" cy="4525963"/>
-          </a:xfrm>
-        </p:spPr>
-        <p:txBody>
-          <a:bodyPr>
-            <a:normAutofit/>
-          </a:bodyPr>
-          <a:lstStyle/>
-          <a:p>
-            <a:pPr marL="0" indent="0">
-              <a:buNone/>
-            </a:pPr>
-            <a:r>
-              <a:rPr lang="en-US" sz="2300" b="1" dirty="0"/>
-              <a:t>Technical </a:t>
-            </a:r>
-            <a:r>
-              <a:rPr lang="en-US" sz="2300" b="1" dirty="0" smtClean="0"/>
-              <a:t>value</a:t>
-            </a:r>
-            <a:r>
-              <a:rPr lang="en-US" sz="2300" dirty="0" smtClean="0"/>
-              <a:t>: assessing </a:t>
-            </a:r>
-            <a:r>
-              <a:rPr lang="en-US" sz="2300" dirty="0"/>
-              <a:t>the technology </a:t>
-            </a:r>
-            <a:r>
-              <a:rPr lang="en-US" sz="2300" dirty="0" smtClean="0"/>
-              <a:t>underlying the </a:t>
-            </a:r>
-            <a:r>
-              <a:rPr lang="en-US" sz="2300" dirty="0"/>
-              <a:t>identifier scheme</a:t>
-            </a:r>
-            <a:r>
-              <a:rPr lang="en-US" sz="2300" dirty="0" smtClean="0"/>
-              <a:t>; </a:t>
-            </a:r>
-          </a:p>
-          <a:p>
-            <a:pPr marL="0" indent="0">
-              <a:buNone/>
-            </a:pPr>
-            <a:endParaRPr lang="en-US" sz="2300" dirty="0" smtClean="0"/>
-          </a:p>
-          <a:p>
-            <a:pPr marL="0" indent="0">
-              <a:buNone/>
-            </a:pPr>
-            <a:r>
-              <a:rPr lang="en-US" sz="2300" b="1" dirty="0" smtClean="0"/>
-              <a:t>User value</a:t>
-            </a:r>
-            <a:r>
-              <a:rPr lang="en-US" sz="2300" dirty="0" smtClean="0"/>
-              <a:t>: assessing </a:t>
-            </a:r>
-            <a:r>
-              <a:rPr lang="en-US" sz="2300" dirty="0"/>
-              <a:t>how the scheme is likely to </a:t>
-            </a:r>
-            <a:r>
-              <a:rPr lang="en-US" sz="2300" dirty="0" smtClean="0"/>
-              <a:t>make end user’s </a:t>
-            </a:r>
-            <a:r>
-              <a:rPr lang="en-US" sz="2300" dirty="0"/>
-              <a:t>lives easier or more difficult; and</a:t>
-            </a:r>
-          </a:p>
-          <a:p>
-            <a:pPr marL="0" indent="0">
-              <a:buNone/>
-            </a:pPr>
-            <a:endParaRPr lang="en-US" sz="2300" dirty="0"/>
-          </a:p>
-          <a:p>
-            <a:pPr marL="0" indent="0">
-              <a:buNone/>
-            </a:pPr>
-            <a:r>
-              <a:rPr lang="en-US" sz="2300" b="1" dirty="0"/>
-              <a:t>Archive </a:t>
-            </a:r>
-            <a:r>
-              <a:rPr lang="en-US" sz="2300" b="1" dirty="0" smtClean="0"/>
-              <a:t>value: </a:t>
-            </a:r>
-            <a:r>
-              <a:rPr lang="en-US" sz="2300" dirty="0" smtClean="0"/>
-              <a:t>assessing </a:t>
-            </a:r>
-            <a:r>
-              <a:rPr lang="en-US" sz="2300" dirty="0"/>
-              <a:t>whether an identifier scheme </a:t>
-            </a:r>
-            <a:r>
-              <a:rPr lang="en-US" sz="2300" dirty="0" smtClean="0"/>
-              <a:t>is likely </a:t>
-            </a:r>
-            <a:r>
-              <a:rPr lang="en-US" sz="2300" dirty="0"/>
-              <a:t>to make the job of data management easier </a:t>
-            </a:r>
-            <a:r>
-              <a:rPr lang="en-US" sz="2300" dirty="0" smtClean="0"/>
-              <a:t>or more </a:t>
-            </a:r>
-            <a:r>
-              <a:rPr lang="en-US" sz="2300" dirty="0"/>
-              <a:t>complicated</a:t>
-            </a:r>
-          </a:p>
-          <a:p>
-            <a:pPr marL="0" indent="0">
-              <a:buNone/>
-            </a:pPr>
-            <a:endParaRPr lang="en-US" sz="2000" dirty="0"/>
-          </a:p>
-        </p:txBody>
-      </p:sp>
-      <p:sp>
-        <p:nvSpPr>
-          <p:cNvPr id="4" name="Rectangle 3"/>
-          <p:cNvSpPr/>
-          <p:nvPr/>
-        </p:nvSpPr>
-        <p:spPr>
-          <a:xfrm>
-            <a:off x="6178752" y="5217064"/>
-            <a:ext cx="4572000" cy="369332"/>
-          </a:xfrm>
-          <a:prstGeom prst="rect">
-            <a:avLst/>
-          </a:prstGeom>
-        </p:spPr>
-        <p:txBody>
-          <a:bodyPr>
-            <a:spAutoFit/>
-          </a:bodyPr>
-          <a:lstStyle/>
-          <a:p>
-            <a:r>
-              <a:rPr lang="en-US" dirty="0" smtClean="0"/>
-              <a:t>Duerr, et al. 2011</a:t>
-            </a:r>
-            <a:endParaRPr lang="en-US" dirty="0"/>
-          </a:p>
-        </p:txBody>
-      </p:sp>
-    </p:spTree>
-    <p:extLst>
-      <p:ext uri="{BB962C8B-B14F-4D97-AF65-F5344CB8AC3E}">
-        <p14:creationId xmlns:p14="http://schemas.microsoft.com/office/powerpoint/2010/main" val="109018710"/>
-      </p:ext>
-    </p:extLst>
-  </p:cSld>
-  <p:clrMapOvr>
-    <a:masterClrMapping/>
-  </p:clrMapOvr>
-  <p:timing>
-    <p:tnLst>
-      <p:par>
-        <p:cTn xmlns:p14="http://schemas.microsoft.com/office/powerpoint/2010/main" id="1" dur="indefinite" restart="never" nodeType="tmRoot"/>
-      </p:par>
-    </p:tnLst>
-  </p:timing>
-</p:sld>
-</file>
-
-<file path=ppt/slides/slide7.xml><?xml version="1.0" encoding="utf-8"?>
-<p:sld xmlns:a="http://schemas.openxmlformats.org/drawingml/2006/main" xmlns:r="http://schemas.openxmlformats.org/officeDocument/2006/relationships" xmlns:p="http://schemas.openxmlformats.org/presentationml/2006/main">
-  <p:cSld>
-    <p:spTree>
-      <p:nvGrpSpPr>
-        <p:cNvPr id="1" name=""/>
-        <p:cNvGrpSpPr/>
-        <p:nvPr/>
-      </p:nvGrpSpPr>
-      <p:grpSpPr>
-        <a:xfrm>
-          <a:off x="0" y="0"/>
-          <a:ext cx="0" cy="0"/>
-          <a:chOff x="0" y="0"/>
-          <a:chExt cx="0" cy="0"/>
-        </a:xfrm>
-      </p:grpSpPr>
-      <p:sp>
-        <p:nvSpPr>
-          <p:cNvPr id="2" name="Title 1"/>
-          <p:cNvSpPr>
-            <a:spLocks noGrp="1"/>
-          </p:cNvSpPr>
-          <p:nvPr>
-            <p:ph type="title"/>
-          </p:nvPr>
-        </p:nvSpPr>
-        <p:spPr/>
-        <p:txBody>
-          <a:bodyPr/>
-          <a:lstStyle/>
-          <a:p>
-            <a:r>
-              <a:rPr lang="en-US" dirty="0" smtClean="0"/>
-              <a:t>Example Schemas</a:t>
-            </a:r>
-            <a:endParaRPr lang="en-US" dirty="0"/>
-          </a:p>
-        </p:txBody>
-      </p:sp>
-      <p:sp>
-        <p:nvSpPr>
-          <p:cNvPr id="3" name="Content Placeholder 2"/>
-          <p:cNvSpPr>
-            <a:spLocks noGrp="1"/>
-          </p:cNvSpPr>
-          <p:nvPr>
-            <p:ph idx="1"/>
-          </p:nvPr>
-        </p:nvSpPr>
-        <p:spPr>
-          <a:xfrm>
-            <a:off x="457200" y="1600201"/>
-            <a:ext cx="8229600" cy="3594707"/>
-          </a:xfrm>
-        </p:spPr>
-        <p:txBody>
-          <a:bodyPr numCol="2">
-            <a:noAutofit/>
-          </a:bodyPr>
-          <a:lstStyle/>
-          <a:p>
-            <a:pPr marL="0" indent="0">
-              <a:buNone/>
-            </a:pPr>
-            <a:r>
-              <a:rPr lang="en-US" sz="2000" dirty="0"/>
-              <a:t>Archival Resource Keys (ARKs)</a:t>
-            </a:r>
-          </a:p>
-          <a:p>
-            <a:pPr marL="0" indent="0">
-              <a:buNone/>
-            </a:pPr>
-            <a:endParaRPr lang="en-US" sz="2000" dirty="0"/>
-          </a:p>
-          <a:p>
-            <a:pPr marL="0" indent="0">
-              <a:buNone/>
-            </a:pPr>
-            <a:r>
-              <a:rPr lang="en-US" sz="2000" b="1" dirty="0"/>
-              <a:t>Digital Object Identifiers (DOIs)</a:t>
-            </a:r>
-          </a:p>
-          <a:p>
-            <a:pPr marL="0" indent="0">
-              <a:buNone/>
-            </a:pPr>
-            <a:endParaRPr lang="en-US" sz="2000" dirty="0"/>
-          </a:p>
-          <a:p>
-            <a:pPr marL="0" indent="0">
-              <a:buNone/>
-            </a:pPr>
-            <a:r>
-              <a:rPr lang="en-US" sz="2000" dirty="0"/>
-              <a:t>Extensible Resource Identifiers (XRIs)</a:t>
-            </a:r>
-          </a:p>
-          <a:p>
-            <a:pPr marL="0" indent="0">
-              <a:buNone/>
-            </a:pPr>
-            <a:endParaRPr lang="en-US" sz="2000" dirty="0"/>
-          </a:p>
-          <a:p>
-            <a:pPr marL="0" indent="0">
-              <a:buNone/>
-            </a:pPr>
-            <a:r>
-              <a:rPr lang="en-US" sz="2000" dirty="0"/>
-              <a:t>Handle System (Handles)</a:t>
-            </a:r>
-          </a:p>
-          <a:p>
-            <a:pPr marL="0" indent="0">
-              <a:buNone/>
-            </a:pPr>
-            <a:endParaRPr lang="en-US" sz="2000" dirty="0"/>
-          </a:p>
-          <a:p>
-            <a:pPr marL="0" indent="0">
-              <a:buNone/>
-            </a:pPr>
-            <a:r>
-              <a:rPr lang="en-US" sz="2000" dirty="0"/>
-              <a:t>Life Science Unique Identifiers (LSIDs</a:t>
-            </a:r>
-            <a:r>
-              <a:rPr lang="en-US" sz="2000" dirty="0" smtClean="0"/>
-              <a:t>)</a:t>
-            </a:r>
-            <a:endParaRPr lang="en-US" sz="2000" dirty="0"/>
-          </a:p>
-          <a:p>
-            <a:pPr marL="0" indent="0">
-              <a:buNone/>
-            </a:pPr>
-            <a:r>
-              <a:rPr lang="en-US" sz="2000" dirty="0"/>
-              <a:t>Object Identifiers (OIDs)</a:t>
-            </a:r>
-          </a:p>
-          <a:p>
-            <a:pPr marL="0" indent="0">
-              <a:buNone/>
-            </a:pPr>
-            <a:endParaRPr lang="en-US" sz="2000" dirty="0"/>
-          </a:p>
-          <a:p>
-            <a:pPr marL="0" indent="0">
-              <a:buNone/>
-            </a:pPr>
-            <a:r>
-              <a:rPr lang="en-US" sz="2000" dirty="0"/>
-              <a:t>Persistent Uniform Resource Locators (PURLs</a:t>
-            </a:r>
-            <a:r>
-              <a:rPr lang="en-US" sz="2000" dirty="0" smtClean="0"/>
-              <a:t>)</a:t>
-            </a:r>
-          </a:p>
-          <a:p>
-            <a:pPr marL="0" indent="0">
-              <a:buNone/>
-            </a:pPr>
-            <a:endParaRPr lang="en-US" sz="2000" dirty="0"/>
-          </a:p>
-          <a:p>
-            <a:pPr marL="0" indent="0">
-              <a:buNone/>
-            </a:pPr>
-            <a:r>
-              <a:rPr lang="en-US" sz="2000" dirty="0"/>
-              <a:t>Uniform Resource Identifiers/Names/Locators (URIs</a:t>
-            </a:r>
-            <a:r>
-              <a:rPr lang="en-US" sz="2000" dirty="0" smtClean="0"/>
-              <a:t>/ URNs</a:t>
-            </a:r>
-            <a:r>
-              <a:rPr lang="en-US" sz="2000" dirty="0"/>
-              <a:t>/URLs</a:t>
-            </a:r>
-            <a:r>
-              <a:rPr lang="en-US" sz="2000" dirty="0" smtClean="0"/>
-              <a:t>)</a:t>
-            </a:r>
-          </a:p>
-          <a:p>
-            <a:pPr marL="0" indent="0">
-              <a:buNone/>
-            </a:pPr>
-            <a:endParaRPr lang="en-US" sz="2000" dirty="0" smtClean="0"/>
-          </a:p>
-          <a:p>
-            <a:pPr marL="0" indent="0">
-              <a:buNone/>
-            </a:pPr>
-            <a:r>
-              <a:rPr lang="en-US" sz="2000" dirty="0" smtClean="0"/>
-              <a:t>Universally </a:t>
-            </a:r>
-            <a:r>
-              <a:rPr lang="en-US" sz="2000" dirty="0"/>
-              <a:t>Unique Identifiers (UUIDs</a:t>
-            </a:r>
-            <a:r>
-              <a:rPr lang="en-US" sz="2000" dirty="0" smtClean="0"/>
-              <a:t>)</a:t>
-            </a:r>
-            <a:endParaRPr lang="en-US" sz="2000" dirty="0"/>
-          </a:p>
-        </p:txBody>
-      </p:sp>
-    </p:spTree>
-    <p:extLst>
-      <p:ext uri="{BB962C8B-B14F-4D97-AF65-F5344CB8AC3E}">
-        <p14:creationId xmlns:p14="http://schemas.microsoft.com/office/powerpoint/2010/main" val="2715794482"/>
-      </p:ext>
-    </p:extLst>
-  </p:cSld>
-  <p:clrMapOvr>
-    <a:masterClrMapping/>
-  </p:clrMapOvr>
-</p:sld>
-</file>
-
-<file path=ppt/slides/slide8.xml><?xml version="1.0" encoding="utf-8"?>
-<p:sld xmlns:a="http://schemas.openxmlformats.org/drawingml/2006/main" xmlns:r="http://schemas.openxmlformats.org/officeDocument/2006/relationships" xmlns:p="http://schemas.openxmlformats.org/presentationml/2006/main">
-  <p:cSld>
-    <p:spTree>
-      <p:nvGrpSpPr>
-        <p:cNvPr id="1" name=""/>
-        <p:cNvGrpSpPr/>
-        <p:nvPr/>
-      </p:nvGrpSpPr>
-      <p:grpSpPr>
-        <a:xfrm>
-          <a:off x="0" y="0"/>
-          <a:ext cx="0" cy="0"/>
-          <a:chOff x="0" y="0"/>
-          <a:chExt cx="0" cy="0"/>
-        </a:xfrm>
-      </p:grpSpPr>
-      <p:sp>
-        <p:nvSpPr>
-          <p:cNvPr id="2" name="Title 1"/>
-          <p:cNvSpPr>
-            <a:spLocks noGrp="1"/>
-          </p:cNvSpPr>
-          <p:nvPr>
-            <p:ph type="title"/>
-          </p:nvPr>
-        </p:nvSpPr>
-        <p:spPr>
-          <a:xfrm>
-            <a:off x="457200" y="72614"/>
-            <a:ext cx="8229600" cy="1143000"/>
-          </a:xfrm>
-        </p:spPr>
-        <p:txBody>
-          <a:bodyPr>
-            <a:normAutofit/>
-          </a:bodyPr>
-          <a:lstStyle/>
-          <a:p>
-            <a:r>
-              <a:rPr lang="en-US" sz="2000" dirty="0" smtClean="0"/>
-              <a:t>Evaluating different ID schemas</a:t>
-            </a:r>
-            <a:endParaRPr lang="en-US" sz="2000" dirty="0"/>
-          </a:p>
-        </p:txBody>
-      </p:sp>
-      <p:pic>
-        <p:nvPicPr>
-          <p:cNvPr id="4" name="Picture 3" descr="Screen Shot 2014-12-29 at 2.13.08 PM.png"/>
-          <p:cNvPicPr>
-            <a:picLocks noChangeAspect="1"/>
-          </p:cNvPicPr>
-          <p:nvPr/>
-        </p:nvPicPr>
-        <p:blipFill>
-          <a:blip r:embed="rId2">
-            <a:extLst>
-              <a:ext uri="{28A0092B-C50C-407E-A947-70E740481C1C}">
-                <a14:useLocalDpi xmlns:a14="http://schemas.microsoft.com/office/drawing/2010/main" val="0"/>
-              </a:ext>
-            </a:extLst>
-          </a:blip>
-          <a:stretch>
-            <a:fillRect/>
-          </a:stretch>
-        </p:blipFill>
-        <p:spPr>
-          <a:xfrm>
-            <a:off x="1082344" y="1417638"/>
-            <a:ext cx="6522924" cy="3238462"/>
-          </a:xfrm>
-          <a:prstGeom prst="rect">
-            <a:avLst/>
-          </a:prstGeom>
-        </p:spPr>
-      </p:pic>
-      <p:pic>
-        <p:nvPicPr>
-          <p:cNvPr id="5" name="Picture 4" descr="Screen Shot 2014-12-29 at 2.13.18 PM.png"/>
-          <p:cNvPicPr>
-            <a:picLocks noChangeAspect="1"/>
-          </p:cNvPicPr>
-          <p:nvPr/>
-        </p:nvPicPr>
-        <p:blipFill>
-          <a:blip r:embed="rId3">
-            <a:extLst>
-              <a:ext uri="{28A0092B-C50C-407E-A947-70E740481C1C}">
-                <a14:useLocalDpi xmlns:a14="http://schemas.microsoft.com/office/drawing/2010/main" val="0"/>
-              </a:ext>
-            </a:extLst>
-          </a:blip>
-          <a:stretch>
-            <a:fillRect/>
-          </a:stretch>
-        </p:blipFill>
-        <p:spPr>
-          <a:xfrm>
-            <a:off x="457200" y="4949229"/>
-            <a:ext cx="7937187" cy="400194"/>
-          </a:xfrm>
-          <a:prstGeom prst="rect">
-            <a:avLst/>
-          </a:prstGeom>
-        </p:spPr>
-      </p:pic>
-    </p:spTree>
-    <p:extLst>
-      <p:ext uri="{BB962C8B-B14F-4D97-AF65-F5344CB8AC3E}">
-        <p14:creationId xmlns:p14="http://schemas.microsoft.com/office/powerpoint/2010/main" val="3614893756"/>
-      </p:ext>
-    </p:extLst>
-  </p:cSld>
-  <p:clrMapOvr>
-    <a:masterClrMapping/>
-  </p:clrMapOvr>
-</p:sld>
-</file>
-
-<file path=ppt/slides/slide9.xml><?xml version="1.0" encoding="utf-8"?>
 <p:sld xmlns:a="http://schemas.openxmlformats.org/drawingml/2006/main" xmlns:r="http://schemas.openxmlformats.org/officeDocument/2006/relationships" xmlns:p="http://schemas.openxmlformats.org/presentationml/2006/main">
   <p:cSld>
     <p:spTree>
@@ -5573,6 +4182,2084 @@
     <p:extLst>
       <p:ext uri="{BB962C8B-B14F-4D97-AF65-F5344CB8AC3E}">
         <p14:creationId xmlns:p14="http://schemas.microsoft.com/office/powerpoint/2010/main" val="2712970991"/>
+      </p:ext>
+    </p:extLst>
+  </p:cSld>
+  <p:clrMapOvr>
+    <a:masterClrMapping/>
+  </p:clrMapOvr>
+</p:sld>
+</file>
+
+<file path=ppt/slides/slide12.xml><?xml version="1.0" encoding="utf-8"?>
+<p:sld xmlns:a="http://schemas.openxmlformats.org/drawingml/2006/main" xmlns:r="http://schemas.openxmlformats.org/officeDocument/2006/relationships" xmlns:p="http://schemas.openxmlformats.org/presentationml/2006/main">
+  <p:cSld>
+    <p:spTree>
+      <p:nvGrpSpPr>
+        <p:cNvPr id="1" name=""/>
+        <p:cNvGrpSpPr/>
+        <p:nvPr/>
+      </p:nvGrpSpPr>
+      <p:grpSpPr>
+        <a:xfrm>
+          <a:off x="0" y="0"/>
+          <a:ext cx="0" cy="0"/>
+          <a:chOff x="0" y="0"/>
+          <a:chExt cx="0" cy="0"/>
+        </a:xfrm>
+      </p:grpSpPr>
+      <p:sp>
+        <p:nvSpPr>
+          <p:cNvPr id="2" name="Title 1"/>
+          <p:cNvSpPr>
+            <a:spLocks noGrp="1"/>
+          </p:cNvSpPr>
+          <p:nvPr>
+            <p:ph type="title"/>
+          </p:nvPr>
+        </p:nvSpPr>
+        <p:spPr/>
+        <p:txBody>
+          <a:bodyPr/>
+          <a:lstStyle/>
+          <a:p>
+            <a:r>
+              <a:rPr lang="en-US" dirty="0" smtClean="0"/>
+              <a:t>m:1</a:t>
+            </a:r>
+            <a:endParaRPr lang="en-US" dirty="0"/>
+          </a:p>
+        </p:txBody>
+      </p:sp>
+      <p:sp>
+        <p:nvSpPr>
+          <p:cNvPr id="3" name="Content Placeholder 2"/>
+          <p:cNvSpPr>
+            <a:spLocks noGrp="1"/>
+          </p:cNvSpPr>
+          <p:nvPr>
+            <p:ph idx="1"/>
+          </p:nvPr>
+        </p:nvSpPr>
+        <p:spPr/>
+        <p:txBody>
+          <a:bodyPr/>
+          <a:lstStyle/>
+          <a:p>
+            <a:r>
+              <a:rPr lang="en-US" dirty="0" smtClean="0"/>
+              <a:t>One resource can have many </a:t>
+            </a:r>
+            <a:r>
+              <a:rPr lang="en-US" dirty="0" smtClean="0"/>
+              <a:t>DOIs</a:t>
+            </a:r>
+          </a:p>
+          <a:p>
+            <a:endParaRPr lang="en-US" dirty="0" smtClean="0"/>
+          </a:p>
+          <a:p>
+            <a:r>
+              <a:rPr lang="en-US" dirty="0" smtClean="0"/>
+              <a:t>This points us to a key challenge….</a:t>
+            </a:r>
+            <a:endParaRPr lang="en-US" dirty="0"/>
+          </a:p>
+        </p:txBody>
+      </p:sp>
+    </p:spTree>
+    <p:extLst>
+      <p:ext uri="{BB962C8B-B14F-4D97-AF65-F5344CB8AC3E}">
+        <p14:creationId xmlns:p14="http://schemas.microsoft.com/office/powerpoint/2010/main" val="2022625081"/>
+      </p:ext>
+    </p:extLst>
+  </p:cSld>
+  <p:clrMapOvr>
+    <a:masterClrMapping/>
+  </p:clrMapOvr>
+</p:sld>
+</file>
+
+<file path=ppt/slides/slide13.xml><?xml version="1.0" encoding="utf-8"?>
+<p:sld xmlns:a="http://schemas.openxmlformats.org/drawingml/2006/main" xmlns:r="http://schemas.openxmlformats.org/officeDocument/2006/relationships" xmlns:p="http://schemas.openxmlformats.org/presentationml/2006/main">
+  <p:cSld>
+    <p:spTree>
+      <p:nvGrpSpPr>
+        <p:cNvPr id="1" name=""/>
+        <p:cNvGrpSpPr/>
+        <p:nvPr/>
+      </p:nvGrpSpPr>
+      <p:grpSpPr>
+        <a:xfrm>
+          <a:off x="0" y="0"/>
+          <a:ext cx="0" cy="0"/>
+          <a:chOff x="0" y="0"/>
+          <a:chExt cx="0" cy="0"/>
+        </a:xfrm>
+      </p:grpSpPr>
+      <p:sp>
+        <p:nvSpPr>
+          <p:cNvPr id="2" name="Title 1"/>
+          <p:cNvSpPr>
+            <a:spLocks noGrp="1"/>
+          </p:cNvSpPr>
+          <p:nvPr>
+            <p:ph type="title"/>
+          </p:nvPr>
+        </p:nvSpPr>
+        <p:spPr/>
+        <p:txBody>
+          <a:bodyPr>
+            <a:normAutofit fontScale="90000"/>
+          </a:bodyPr>
+          <a:lstStyle/>
+          <a:p>
+            <a:r>
+              <a:rPr lang="en-US" dirty="0" smtClean="0"/>
+              <a:t>Qualities of an ID for data curation</a:t>
+            </a:r>
+            <a:endParaRPr lang="en-US" dirty="0"/>
+          </a:p>
+        </p:txBody>
+      </p:sp>
+      <p:sp>
+        <p:nvSpPr>
+          <p:cNvPr id="3" name="Content Placeholder 2"/>
+          <p:cNvSpPr>
+            <a:spLocks noGrp="1"/>
+          </p:cNvSpPr>
+          <p:nvPr>
+            <p:ph idx="1"/>
+          </p:nvPr>
+        </p:nvSpPr>
+        <p:spPr/>
+        <p:txBody>
+          <a:bodyPr/>
+          <a:lstStyle/>
+          <a:p>
+            <a:r>
+              <a:rPr lang="en-US" dirty="0" smtClean="0"/>
+              <a:t>Machine Readable</a:t>
+            </a:r>
+          </a:p>
+          <a:p>
+            <a:r>
+              <a:rPr lang="en-US" dirty="0" smtClean="0"/>
+              <a:t>Unique</a:t>
+            </a:r>
+          </a:p>
+          <a:p>
+            <a:r>
+              <a:rPr lang="en-US" b="1" dirty="0" smtClean="0"/>
+              <a:t>Persistent</a:t>
+            </a:r>
+          </a:p>
+          <a:p>
+            <a:r>
+              <a:rPr lang="en-US" b="1" dirty="0" smtClean="0"/>
+              <a:t>Resolvable</a:t>
+            </a:r>
+          </a:p>
+          <a:p>
+            <a:pPr marL="0" indent="0">
+              <a:buNone/>
+            </a:pPr>
+            <a:endParaRPr lang="en-US" dirty="0" smtClean="0"/>
+          </a:p>
+        </p:txBody>
+      </p:sp>
+    </p:spTree>
+    <p:extLst>
+      <p:ext uri="{BB962C8B-B14F-4D97-AF65-F5344CB8AC3E}">
+        <p14:creationId xmlns:p14="http://schemas.microsoft.com/office/powerpoint/2010/main" val="1631999202"/>
+      </p:ext>
+    </p:extLst>
+  </p:cSld>
+  <p:clrMapOvr>
+    <a:masterClrMapping/>
+  </p:clrMapOvr>
+  <p:timing>
+    <p:tnLst>
+      <p:par>
+        <p:cTn xmlns:p14="http://schemas.microsoft.com/office/powerpoint/2010/main" id="1" dur="indefinite" restart="never" nodeType="tmRoot"/>
+      </p:par>
+    </p:tnLst>
+  </p:timing>
+</p:sld>
+</file>
+
+<file path=ppt/slides/slide14.xml><?xml version="1.0" encoding="utf-8"?>
+<p:sld xmlns:a="http://schemas.openxmlformats.org/drawingml/2006/main" xmlns:r="http://schemas.openxmlformats.org/officeDocument/2006/relationships" xmlns:p="http://schemas.openxmlformats.org/presentationml/2006/main">
+  <p:cSld>
+    <p:spTree>
+      <p:nvGrpSpPr>
+        <p:cNvPr id="1" name=""/>
+        <p:cNvGrpSpPr/>
+        <p:nvPr/>
+      </p:nvGrpSpPr>
+      <p:grpSpPr>
+        <a:xfrm>
+          <a:off x="0" y="0"/>
+          <a:ext cx="0" cy="0"/>
+          <a:chOff x="0" y="0"/>
+          <a:chExt cx="0" cy="0"/>
+        </a:xfrm>
+      </p:grpSpPr>
+      <p:sp>
+        <p:nvSpPr>
+          <p:cNvPr id="2" name="Title 1"/>
+          <p:cNvSpPr>
+            <a:spLocks noGrp="1"/>
+          </p:cNvSpPr>
+          <p:nvPr>
+            <p:ph type="title"/>
+          </p:nvPr>
+        </p:nvSpPr>
+        <p:spPr/>
+        <p:txBody>
+          <a:bodyPr/>
+          <a:lstStyle/>
+          <a:p>
+            <a:r>
+              <a:rPr lang="en-US" dirty="0" smtClean="0"/>
+              <a:t>An ID alone isn’t enough</a:t>
+            </a:r>
+            <a:endParaRPr lang="en-US" dirty="0"/>
+          </a:p>
+        </p:txBody>
+      </p:sp>
+      <p:sp>
+        <p:nvSpPr>
+          <p:cNvPr id="3" name="Content Placeholder 2"/>
+          <p:cNvSpPr>
+            <a:spLocks noGrp="1"/>
+          </p:cNvSpPr>
+          <p:nvPr>
+            <p:ph idx="1"/>
+          </p:nvPr>
+        </p:nvSpPr>
+        <p:spPr/>
+        <p:txBody>
+          <a:bodyPr/>
+          <a:lstStyle/>
+          <a:p>
+            <a:r>
+              <a:rPr lang="en-US" dirty="0" smtClean="0"/>
+              <a:t>ID’s are pointers – they need to point to </a:t>
+            </a:r>
+            <a:r>
+              <a:rPr lang="en-US" dirty="0" smtClean="0"/>
+              <a:t>something</a:t>
+            </a:r>
+            <a:endParaRPr lang="en-US" dirty="0" smtClean="0"/>
+          </a:p>
+          <a:p>
+            <a:r>
+              <a:rPr lang="en-US" dirty="0" smtClean="0"/>
+              <a:t>Just as an address won’t prevent a house from being demolished or remodeled, an ID will not prevent “content drift” or data from being deleted</a:t>
+            </a:r>
+          </a:p>
+          <a:p>
+            <a:r>
+              <a:rPr lang="en-US" dirty="0" smtClean="0"/>
+              <a:t>They don’t make content more reliable or citable</a:t>
+            </a:r>
+            <a:endParaRPr lang="en-US" dirty="0"/>
+          </a:p>
+        </p:txBody>
+      </p:sp>
+    </p:spTree>
+    <p:extLst>
+      <p:ext uri="{BB962C8B-B14F-4D97-AF65-F5344CB8AC3E}">
+        <p14:creationId xmlns:p14="http://schemas.microsoft.com/office/powerpoint/2010/main" val="1798583032"/>
+      </p:ext>
+    </p:extLst>
+  </p:cSld>
+  <p:clrMapOvr>
+    <a:masterClrMapping/>
+  </p:clrMapOvr>
+</p:sld>
+</file>
+
+<file path=ppt/slides/slide15.xml><?xml version="1.0" encoding="utf-8"?>
+<p:sld xmlns:a="http://schemas.openxmlformats.org/drawingml/2006/main" xmlns:r="http://schemas.openxmlformats.org/officeDocument/2006/relationships" xmlns:p="http://schemas.openxmlformats.org/presentationml/2006/main">
+  <p:cSld>
+    <p:spTree>
+      <p:nvGrpSpPr>
+        <p:cNvPr id="1" name=""/>
+        <p:cNvGrpSpPr/>
+        <p:nvPr/>
+      </p:nvGrpSpPr>
+      <p:grpSpPr>
+        <a:xfrm>
+          <a:off x="0" y="0"/>
+          <a:ext cx="0" cy="0"/>
+          <a:chOff x="0" y="0"/>
+          <a:chExt cx="0" cy="0"/>
+        </a:xfrm>
+      </p:grpSpPr>
+      <p:sp>
+        <p:nvSpPr>
+          <p:cNvPr id="2" name="Title 1"/>
+          <p:cNvSpPr>
+            <a:spLocks noGrp="1"/>
+          </p:cNvSpPr>
+          <p:nvPr>
+            <p:ph type="title"/>
+          </p:nvPr>
+        </p:nvSpPr>
+        <p:spPr/>
+        <p:txBody>
+          <a:bodyPr/>
+          <a:lstStyle/>
+          <a:p>
+            <a:r>
+              <a:rPr lang="en-US" dirty="0" smtClean="0"/>
+              <a:t>DOI services differ!</a:t>
+            </a:r>
+            <a:endParaRPr lang="en-US" dirty="0"/>
+          </a:p>
+        </p:txBody>
+      </p:sp>
+      <p:pic>
+        <p:nvPicPr>
+          <p:cNvPr id="4" name="Picture 3"/>
+          <p:cNvPicPr>
+            <a:picLocks noChangeAspect="1"/>
+          </p:cNvPicPr>
+          <p:nvPr/>
+        </p:nvPicPr>
+        <p:blipFill>
+          <a:blip r:embed="rId2"/>
+          <a:stretch>
+            <a:fillRect/>
+          </a:stretch>
+        </p:blipFill>
+        <p:spPr>
+          <a:xfrm>
+            <a:off x="1279782" y="1979309"/>
+            <a:ext cx="1664224" cy="1584975"/>
+          </a:xfrm>
+          <a:prstGeom prst="rect">
+            <a:avLst/>
+          </a:prstGeom>
+        </p:spPr>
+      </p:pic>
+      <p:pic>
+        <p:nvPicPr>
+          <p:cNvPr id="5" name="Picture 4"/>
+          <p:cNvPicPr>
+            <a:picLocks noChangeAspect="1"/>
+          </p:cNvPicPr>
+          <p:nvPr/>
+        </p:nvPicPr>
+        <p:blipFill>
+          <a:blip r:embed="rId3"/>
+          <a:stretch>
+            <a:fillRect/>
+          </a:stretch>
+        </p:blipFill>
+        <p:spPr>
+          <a:xfrm>
+            <a:off x="4291537" y="2240867"/>
+            <a:ext cx="2540000" cy="1016000"/>
+          </a:xfrm>
+          <a:prstGeom prst="rect">
+            <a:avLst/>
+          </a:prstGeom>
+        </p:spPr>
+      </p:pic>
+      <p:pic>
+        <p:nvPicPr>
+          <p:cNvPr id="10" name="Picture 9"/>
+          <p:cNvPicPr>
+            <a:picLocks noChangeAspect="1"/>
+          </p:cNvPicPr>
+          <p:nvPr/>
+        </p:nvPicPr>
+        <p:blipFill>
+          <a:blip r:embed="rId4"/>
+          <a:stretch>
+            <a:fillRect/>
+          </a:stretch>
+        </p:blipFill>
+        <p:spPr>
+          <a:xfrm>
+            <a:off x="2433193" y="3895305"/>
+            <a:ext cx="3310984" cy="1054287"/>
+          </a:xfrm>
+          <a:prstGeom prst="rect">
+            <a:avLst/>
+          </a:prstGeom>
+        </p:spPr>
+      </p:pic>
+      <p:sp>
+        <p:nvSpPr>
+          <p:cNvPr id="11" name="Rectangle 10"/>
+          <p:cNvSpPr/>
+          <p:nvPr/>
+        </p:nvSpPr>
+        <p:spPr>
+          <a:xfrm>
+            <a:off x="2944006" y="5010634"/>
+            <a:ext cx="4572000" cy="369332"/>
+          </a:xfrm>
+          <a:prstGeom prst="rect">
+            <a:avLst/>
+          </a:prstGeom>
+        </p:spPr>
+        <p:txBody>
+          <a:bodyPr>
+            <a:spAutoFit/>
+          </a:bodyPr>
+          <a:lstStyle/>
+          <a:p>
+            <a:r>
+              <a:rPr lang="en-US" dirty="0" smtClean="0"/>
+              <a:t>But not ideal</a:t>
+            </a:r>
+            <a:endParaRPr lang="en-US" dirty="0"/>
+          </a:p>
+        </p:txBody>
+      </p:sp>
+    </p:spTree>
+    <p:extLst>
+      <p:ext uri="{BB962C8B-B14F-4D97-AF65-F5344CB8AC3E}">
+        <p14:creationId xmlns:p14="http://schemas.microsoft.com/office/powerpoint/2010/main" val="1101470500"/>
+      </p:ext>
+    </p:extLst>
+  </p:cSld>
+  <p:clrMapOvr>
+    <a:masterClrMapping/>
+  </p:clrMapOvr>
+</p:sld>
+</file>
+
+<file path=ppt/slides/slide16.xml><?xml version="1.0" encoding="utf-8"?>
+<p:sld xmlns:a="http://schemas.openxmlformats.org/drawingml/2006/main" xmlns:r="http://schemas.openxmlformats.org/officeDocument/2006/relationships" xmlns:p="http://schemas.openxmlformats.org/presentationml/2006/main">
+  <p:cSld>
+    <p:spTree>
+      <p:nvGrpSpPr>
+        <p:cNvPr id="1" name=""/>
+        <p:cNvGrpSpPr/>
+        <p:nvPr/>
+      </p:nvGrpSpPr>
+      <p:grpSpPr>
+        <a:xfrm>
+          <a:off x="0" y="0"/>
+          <a:ext cx="0" cy="0"/>
+          <a:chOff x="0" y="0"/>
+          <a:chExt cx="0" cy="0"/>
+        </a:xfrm>
+      </p:grpSpPr>
+      <p:sp>
+        <p:nvSpPr>
+          <p:cNvPr id="2" name="Title 1"/>
+          <p:cNvSpPr>
+            <a:spLocks noGrp="1"/>
+          </p:cNvSpPr>
+          <p:nvPr>
+            <p:ph type="title"/>
+          </p:nvPr>
+        </p:nvSpPr>
+        <p:spPr/>
+        <p:txBody>
+          <a:bodyPr/>
+          <a:lstStyle/>
+          <a:p>
+            <a:r>
+              <a:rPr lang="en-US" dirty="0" smtClean="0"/>
+              <a:t>DOI services differ!</a:t>
+            </a:r>
+            <a:endParaRPr lang="en-US" dirty="0"/>
+          </a:p>
+        </p:txBody>
+      </p:sp>
+      <p:pic>
+        <p:nvPicPr>
+          <p:cNvPr id="4" name="Picture 3"/>
+          <p:cNvPicPr>
+            <a:picLocks noChangeAspect="1"/>
+          </p:cNvPicPr>
+          <p:nvPr/>
+        </p:nvPicPr>
+        <p:blipFill>
+          <a:blip r:embed="rId3"/>
+          <a:stretch>
+            <a:fillRect/>
+          </a:stretch>
+        </p:blipFill>
+        <p:spPr>
+          <a:xfrm>
+            <a:off x="1279782" y="1979309"/>
+            <a:ext cx="1664224" cy="1584975"/>
+          </a:xfrm>
+          <a:prstGeom prst="rect">
+            <a:avLst/>
+          </a:prstGeom>
+        </p:spPr>
+      </p:pic>
+      <p:pic>
+        <p:nvPicPr>
+          <p:cNvPr id="5" name="Picture 4"/>
+          <p:cNvPicPr>
+            <a:picLocks noChangeAspect="1"/>
+          </p:cNvPicPr>
+          <p:nvPr/>
+        </p:nvPicPr>
+        <p:blipFill>
+          <a:blip r:embed="rId4"/>
+          <a:stretch>
+            <a:fillRect/>
+          </a:stretch>
+        </p:blipFill>
+        <p:spPr>
+          <a:xfrm>
+            <a:off x="4291537" y="2240867"/>
+            <a:ext cx="2540000" cy="1016000"/>
+          </a:xfrm>
+          <a:prstGeom prst="rect">
+            <a:avLst/>
+          </a:prstGeom>
+        </p:spPr>
+      </p:pic>
+      <p:pic>
+        <p:nvPicPr>
+          <p:cNvPr id="10" name="Picture 9"/>
+          <p:cNvPicPr>
+            <a:picLocks noChangeAspect="1"/>
+          </p:cNvPicPr>
+          <p:nvPr/>
+        </p:nvPicPr>
+        <p:blipFill>
+          <a:blip r:embed="rId5"/>
+          <a:stretch>
+            <a:fillRect/>
+          </a:stretch>
+        </p:blipFill>
+        <p:spPr>
+          <a:xfrm>
+            <a:off x="2433193" y="3895305"/>
+            <a:ext cx="3310984" cy="1054287"/>
+          </a:xfrm>
+          <a:prstGeom prst="rect">
+            <a:avLst/>
+          </a:prstGeom>
+        </p:spPr>
+      </p:pic>
+      <p:sp>
+        <p:nvSpPr>
+          <p:cNvPr id="11" name="Rectangle 10"/>
+          <p:cNvSpPr/>
+          <p:nvPr/>
+        </p:nvSpPr>
+        <p:spPr>
+          <a:xfrm>
+            <a:off x="2944006" y="5010634"/>
+            <a:ext cx="4572000" cy="369332"/>
+          </a:xfrm>
+          <a:prstGeom prst="rect">
+            <a:avLst/>
+          </a:prstGeom>
+        </p:spPr>
+        <p:txBody>
+          <a:bodyPr>
+            <a:spAutoFit/>
+          </a:bodyPr>
+          <a:lstStyle/>
+          <a:p>
+            <a:r>
+              <a:rPr lang="en-US" dirty="0" smtClean="0"/>
+              <a:t>But not ideal</a:t>
+            </a:r>
+            <a:endParaRPr lang="en-US" dirty="0"/>
+          </a:p>
+        </p:txBody>
+      </p:sp>
+    </p:spTree>
+    <p:extLst>
+      <p:ext uri="{BB962C8B-B14F-4D97-AF65-F5344CB8AC3E}">
+        <p14:creationId xmlns:p14="http://schemas.microsoft.com/office/powerpoint/2010/main" val="1737687593"/>
+      </p:ext>
+    </p:extLst>
+  </p:cSld>
+  <p:clrMapOvr>
+    <a:masterClrMapping/>
+  </p:clrMapOvr>
+</p:sld>
+</file>
+
+<file path=ppt/slides/slide17.xml><?xml version="1.0" encoding="utf-8"?>
+<p:sld xmlns:a="http://schemas.openxmlformats.org/drawingml/2006/main" xmlns:r="http://schemas.openxmlformats.org/officeDocument/2006/relationships" xmlns:p="http://schemas.openxmlformats.org/presentationml/2006/main">
+  <p:cSld>
+    <p:spTree>
+      <p:nvGrpSpPr>
+        <p:cNvPr id="1" name=""/>
+        <p:cNvGrpSpPr/>
+        <p:nvPr/>
+      </p:nvGrpSpPr>
+      <p:grpSpPr>
+        <a:xfrm>
+          <a:off x="0" y="0"/>
+          <a:ext cx="0" cy="0"/>
+          <a:chOff x="0" y="0"/>
+          <a:chExt cx="0" cy="0"/>
+        </a:xfrm>
+      </p:grpSpPr>
+      <p:sp>
+        <p:nvSpPr>
+          <p:cNvPr id="2" name="Title 1"/>
+          <p:cNvSpPr>
+            <a:spLocks noGrp="1"/>
+          </p:cNvSpPr>
+          <p:nvPr>
+            <p:ph type="title"/>
+          </p:nvPr>
+        </p:nvSpPr>
+        <p:spPr/>
+        <p:txBody>
+          <a:bodyPr>
+            <a:normAutofit fontScale="90000"/>
+          </a:bodyPr>
+          <a:lstStyle/>
+          <a:p>
+            <a:r>
+              <a:rPr lang="en-US" dirty="0" smtClean="0"/>
+              <a:t>Finally: Data </a:t>
+            </a:r>
+            <a:r>
+              <a:rPr lang="en-US" dirty="0" smtClean="0"/>
+              <a:t>objects “version” differently</a:t>
+            </a:r>
+            <a:endParaRPr lang="en-US" dirty="0"/>
+          </a:p>
+        </p:txBody>
+      </p:sp>
+      <p:sp>
+        <p:nvSpPr>
+          <p:cNvPr id="3" name="Content Placeholder 2"/>
+          <p:cNvSpPr>
+            <a:spLocks noGrp="1"/>
+          </p:cNvSpPr>
+          <p:nvPr>
+            <p:ph idx="1"/>
+          </p:nvPr>
+        </p:nvSpPr>
+        <p:spPr/>
+        <p:txBody>
+          <a:bodyPr/>
+          <a:lstStyle/>
+          <a:p>
+            <a:r>
+              <a:rPr lang="en-US" dirty="0" smtClean="0"/>
+              <a:t>Books: volumes, editions, issues</a:t>
+            </a:r>
+          </a:p>
+          <a:p>
+            <a:r>
+              <a:rPr lang="en-US" dirty="0" smtClean="0"/>
+              <a:t>Software: versions, builds</a:t>
+            </a:r>
+          </a:p>
+          <a:p>
+            <a:r>
+              <a:rPr lang="en-US" dirty="0" smtClean="0"/>
+              <a:t>Datasets: are sometimes versioned, but often accrete or change gradually over time</a:t>
+            </a:r>
+          </a:p>
+          <a:p>
+            <a:r>
+              <a:rPr lang="en-US" b="1" dirty="0" smtClean="0"/>
+              <a:t>Identifier management must coincide with data management, project management, and creation of good documentation</a:t>
+            </a:r>
+            <a:endParaRPr lang="en-US" b="1" dirty="0"/>
+          </a:p>
+        </p:txBody>
+      </p:sp>
+    </p:spTree>
+    <p:extLst>
+      <p:ext uri="{BB962C8B-B14F-4D97-AF65-F5344CB8AC3E}">
+        <p14:creationId xmlns:p14="http://schemas.microsoft.com/office/powerpoint/2010/main" val="17518017"/>
+      </p:ext>
+    </p:extLst>
+  </p:cSld>
+  <p:clrMapOvr>
+    <a:masterClrMapping/>
+  </p:clrMapOvr>
+</p:sld>
+</file>
+
+<file path=ppt/slides/slide18.xml><?xml version="1.0" encoding="utf-8"?>
+<p:sld xmlns:a="http://schemas.openxmlformats.org/drawingml/2006/main" xmlns:r="http://schemas.openxmlformats.org/officeDocument/2006/relationships" xmlns:p="http://schemas.openxmlformats.org/presentationml/2006/main">
+  <p:cSld>
+    <p:spTree>
+      <p:nvGrpSpPr>
+        <p:cNvPr id="1" name=""/>
+        <p:cNvGrpSpPr/>
+        <p:nvPr/>
+      </p:nvGrpSpPr>
+      <p:grpSpPr>
+        <a:xfrm>
+          <a:off x="0" y="0"/>
+          <a:ext cx="0" cy="0"/>
+          <a:chOff x="0" y="0"/>
+          <a:chExt cx="0" cy="0"/>
+        </a:xfrm>
+      </p:grpSpPr>
+      <p:sp>
+        <p:nvSpPr>
+          <p:cNvPr id="2" name="Title 1"/>
+          <p:cNvSpPr>
+            <a:spLocks noGrp="1"/>
+          </p:cNvSpPr>
+          <p:nvPr>
+            <p:ph type="title"/>
+          </p:nvPr>
+        </p:nvSpPr>
+        <p:spPr/>
+        <p:txBody>
+          <a:bodyPr/>
+          <a:lstStyle/>
+          <a:p>
+            <a:r>
+              <a:rPr lang="en-US" dirty="0" smtClean="0"/>
+              <a:t>Identifiers and Data Citation	</a:t>
+            </a:r>
+            <a:endParaRPr lang="en-US" dirty="0"/>
+          </a:p>
+        </p:txBody>
+      </p:sp>
+      <p:sp>
+        <p:nvSpPr>
+          <p:cNvPr id="3" name="Content Placeholder 2"/>
+          <p:cNvSpPr>
+            <a:spLocks noGrp="1"/>
+          </p:cNvSpPr>
+          <p:nvPr>
+            <p:ph idx="1"/>
+          </p:nvPr>
+        </p:nvSpPr>
+        <p:spPr/>
+        <p:txBody>
+          <a:bodyPr/>
+          <a:lstStyle/>
+          <a:p>
+            <a:r>
+              <a:rPr lang="en-US" dirty="0" smtClean="0"/>
+              <a:t>More on this in this afternoon’s lab</a:t>
+            </a:r>
+            <a:endParaRPr lang="en-US" dirty="0"/>
+          </a:p>
+        </p:txBody>
+      </p:sp>
+    </p:spTree>
+    <p:extLst>
+      <p:ext uri="{BB962C8B-B14F-4D97-AF65-F5344CB8AC3E}">
+        <p14:creationId xmlns:p14="http://schemas.microsoft.com/office/powerpoint/2010/main" val="4258006668"/>
+      </p:ext>
+    </p:extLst>
+  </p:cSld>
+  <p:clrMapOvr>
+    <a:masterClrMapping/>
+  </p:clrMapOvr>
+</p:sld>
+</file>
+
+<file path=ppt/slides/slide2.xml><?xml version="1.0" encoding="utf-8"?>
+<p:sld xmlns:a="http://schemas.openxmlformats.org/drawingml/2006/main" xmlns:r="http://schemas.openxmlformats.org/officeDocument/2006/relationships" xmlns:p="http://schemas.openxmlformats.org/presentationml/2006/main">
+  <p:cSld>
+    <p:spTree>
+      <p:nvGrpSpPr>
+        <p:cNvPr id="1" name=""/>
+        <p:cNvGrpSpPr/>
+        <p:nvPr/>
+      </p:nvGrpSpPr>
+      <p:grpSpPr>
+        <a:xfrm>
+          <a:off x="0" y="0"/>
+          <a:ext cx="0" cy="0"/>
+          <a:chOff x="0" y="0"/>
+          <a:chExt cx="0" cy="0"/>
+        </a:xfrm>
+      </p:grpSpPr>
+      <p:sp>
+        <p:nvSpPr>
+          <p:cNvPr id="2" name="Title 1"/>
+          <p:cNvSpPr>
+            <a:spLocks noGrp="1"/>
+          </p:cNvSpPr>
+          <p:nvPr>
+            <p:ph type="title"/>
+          </p:nvPr>
+        </p:nvSpPr>
+        <p:spPr/>
+        <p:txBody>
+          <a:bodyPr/>
+          <a:lstStyle/>
+          <a:p>
+            <a:r>
+              <a:rPr lang="en-US" dirty="0" smtClean="0"/>
+              <a:t>What is an identifier? </a:t>
+            </a:r>
+            <a:endParaRPr lang="en-US" dirty="0"/>
+          </a:p>
+        </p:txBody>
+      </p:sp>
+      <p:sp>
+        <p:nvSpPr>
+          <p:cNvPr id="3" name="Content Placeholder 2"/>
+          <p:cNvSpPr>
+            <a:spLocks noGrp="1"/>
+          </p:cNvSpPr>
+          <p:nvPr>
+            <p:ph idx="1"/>
+          </p:nvPr>
+        </p:nvSpPr>
+        <p:spPr/>
+        <p:txBody>
+          <a:bodyPr/>
+          <a:lstStyle/>
+          <a:p>
+            <a:r>
+              <a:rPr lang="en-US" dirty="0" smtClean="0"/>
+              <a:t>“</a:t>
+            </a:r>
+            <a:r>
+              <a:rPr lang="en-US" i="1" dirty="0" smtClean="0"/>
+              <a:t>a name that identifies either a unique object or a unique class of objects”</a:t>
+            </a:r>
+          </a:p>
+        </p:txBody>
+      </p:sp>
+    </p:spTree>
+    <p:extLst>
+      <p:ext uri="{BB962C8B-B14F-4D97-AF65-F5344CB8AC3E}">
+        <p14:creationId xmlns:p14="http://schemas.microsoft.com/office/powerpoint/2010/main" val="5531785"/>
+      </p:ext>
+    </p:extLst>
+  </p:cSld>
+  <p:clrMapOvr>
+    <a:masterClrMapping/>
+  </p:clrMapOvr>
+  <p:timing>
+    <p:tnLst>
+      <p:par>
+        <p:cTn xmlns:p14="http://schemas.microsoft.com/office/powerpoint/2010/main" id="1" dur="indefinite" restart="never" nodeType="tmRoot"/>
+      </p:par>
+    </p:tnLst>
+  </p:timing>
+</p:sld>
+</file>
+
+<file path=ppt/slides/slide3.xml><?xml version="1.0" encoding="utf-8"?>
+<p:sld xmlns:a="http://schemas.openxmlformats.org/drawingml/2006/main" xmlns:r="http://schemas.openxmlformats.org/officeDocument/2006/relationships" xmlns:p="http://schemas.openxmlformats.org/presentationml/2006/main">
+  <p:cSld>
+    <p:spTree>
+      <p:nvGrpSpPr>
+        <p:cNvPr id="1" name=""/>
+        <p:cNvGrpSpPr/>
+        <p:nvPr/>
+      </p:nvGrpSpPr>
+      <p:grpSpPr>
+        <a:xfrm>
+          <a:off x="0" y="0"/>
+          <a:ext cx="0" cy="0"/>
+          <a:chOff x="0" y="0"/>
+          <a:chExt cx="0" cy="0"/>
+        </a:xfrm>
+      </p:grpSpPr>
+      <p:pic>
+        <p:nvPicPr>
+          <p:cNvPr id="9" name="Picture 8" descr="identifier.tiff"/>
+          <p:cNvPicPr>
+            <a:picLocks noChangeAspect="1"/>
+          </p:cNvPicPr>
+          <p:nvPr/>
+        </p:nvPicPr>
+        <p:blipFill>
+          <a:blip r:embed="rId2">
+            <a:extLst>
+              <a:ext uri="{28A0092B-C50C-407E-A947-70E740481C1C}">
+                <a14:useLocalDpi xmlns:a14="http://schemas.microsoft.com/office/drawing/2010/main" val="0"/>
+              </a:ext>
+            </a:extLst>
+          </a:blip>
+          <a:stretch>
+            <a:fillRect/>
+          </a:stretch>
+        </p:blipFill>
+        <p:spPr>
+          <a:xfrm>
+            <a:off x="0" y="2327662"/>
+            <a:ext cx="9144000" cy="3371099"/>
+          </a:xfrm>
+          <a:prstGeom prst="rect">
+            <a:avLst/>
+          </a:prstGeom>
+        </p:spPr>
+      </p:pic>
+      <p:sp>
+        <p:nvSpPr>
+          <p:cNvPr id="2" name="Title 1"/>
+          <p:cNvSpPr>
+            <a:spLocks noGrp="1"/>
+          </p:cNvSpPr>
+          <p:nvPr>
+            <p:ph type="title"/>
+          </p:nvPr>
+        </p:nvSpPr>
+        <p:spPr/>
+        <p:txBody>
+          <a:bodyPr/>
+          <a:lstStyle/>
+          <a:p>
+            <a:r>
+              <a:rPr lang="en-US" dirty="0" smtClean="0"/>
+              <a:t>Identifiers are everywhere</a:t>
+            </a:r>
+            <a:endParaRPr lang="en-US" dirty="0"/>
+          </a:p>
+        </p:txBody>
+      </p:sp>
+      <p:pic>
+        <p:nvPicPr>
+          <p:cNvPr id="7" name="Picture 6" descr="640px-Issn-barcode-explained.png"/>
+          <p:cNvPicPr>
+            <a:picLocks noChangeAspect="1"/>
+          </p:cNvPicPr>
+          <p:nvPr/>
+        </p:nvPicPr>
+        <p:blipFill>
+          <a:blip r:embed="rId3">
+            <a:extLst>
+              <a:ext uri="{28A0092B-C50C-407E-A947-70E740481C1C}">
+                <a14:useLocalDpi xmlns:a14="http://schemas.microsoft.com/office/drawing/2010/main" val="0"/>
+              </a:ext>
+            </a:extLst>
+          </a:blip>
+          <a:stretch>
+            <a:fillRect/>
+          </a:stretch>
+        </p:blipFill>
+        <p:spPr>
+          <a:xfrm>
+            <a:off x="4673596" y="1811189"/>
+            <a:ext cx="2709333" cy="1744132"/>
+          </a:xfrm>
+          <a:prstGeom prst="rect">
+            <a:avLst/>
+          </a:prstGeom>
+        </p:spPr>
+      </p:pic>
+      <p:pic>
+        <p:nvPicPr>
+          <p:cNvPr id="8" name="Picture 7" descr="p_unit.jpg"/>
+          <p:cNvPicPr>
+            <a:picLocks noChangeAspect="1"/>
+          </p:cNvPicPr>
+          <p:nvPr/>
+        </p:nvPicPr>
+        <p:blipFill>
+          <a:blip r:embed="rId4">
+            <a:extLst>
+              <a:ext uri="{28A0092B-C50C-407E-A947-70E740481C1C}">
+                <a14:useLocalDpi xmlns:a14="http://schemas.microsoft.com/office/drawing/2010/main" val="0"/>
+              </a:ext>
+            </a:extLst>
+          </a:blip>
+          <a:stretch>
+            <a:fillRect/>
+          </a:stretch>
+        </p:blipFill>
+        <p:spPr>
+          <a:xfrm>
+            <a:off x="1012040" y="1605964"/>
+            <a:ext cx="3509162" cy="2932169"/>
+          </a:xfrm>
+          <a:prstGeom prst="rect">
+            <a:avLst/>
+          </a:prstGeom>
+        </p:spPr>
+      </p:pic>
+    </p:spTree>
+    <p:extLst>
+      <p:ext uri="{BB962C8B-B14F-4D97-AF65-F5344CB8AC3E}">
+        <p14:creationId xmlns:p14="http://schemas.microsoft.com/office/powerpoint/2010/main" val="1089484448"/>
+      </p:ext>
+    </p:extLst>
+  </p:cSld>
+  <p:clrMapOvr>
+    <a:masterClrMapping/>
+  </p:clrMapOvr>
+</p:sld>
+</file>
+
+<file path=ppt/slides/slide4.xml><?xml version="1.0" encoding="utf-8"?>
+<p:sld xmlns:a="http://schemas.openxmlformats.org/drawingml/2006/main" xmlns:r="http://schemas.openxmlformats.org/officeDocument/2006/relationships" xmlns:p="http://schemas.openxmlformats.org/presentationml/2006/main">
+  <p:cSld>
+    <p:spTree>
+      <p:nvGrpSpPr>
+        <p:cNvPr id="1" name=""/>
+        <p:cNvGrpSpPr/>
+        <p:nvPr/>
+      </p:nvGrpSpPr>
+      <p:grpSpPr>
+        <a:xfrm>
+          <a:off x="0" y="0"/>
+          <a:ext cx="0" cy="0"/>
+          <a:chOff x="0" y="0"/>
+          <a:chExt cx="0" cy="0"/>
+        </a:xfrm>
+      </p:grpSpPr>
+      <p:sp>
+        <p:nvSpPr>
+          <p:cNvPr id="2" name="Title 1"/>
+          <p:cNvSpPr>
+            <a:spLocks noGrp="1"/>
+          </p:cNvSpPr>
+          <p:nvPr>
+            <p:ph type="title"/>
+          </p:nvPr>
+        </p:nvSpPr>
+        <p:spPr/>
+        <p:txBody>
+          <a:bodyPr>
+            <a:normAutofit fontScale="90000"/>
+          </a:bodyPr>
+          <a:lstStyle/>
+          <a:p>
+            <a:r>
+              <a:rPr lang="en-US" dirty="0" smtClean="0"/>
+              <a:t>Why IDs matter for data curation?</a:t>
+            </a:r>
+            <a:endParaRPr lang="en-US" dirty="0"/>
+          </a:p>
+        </p:txBody>
+      </p:sp>
+      <p:sp>
+        <p:nvSpPr>
+          <p:cNvPr id="4" name="Rectangle 3"/>
+          <p:cNvSpPr/>
+          <p:nvPr/>
+        </p:nvSpPr>
+        <p:spPr>
+          <a:xfrm>
+            <a:off x="5443511" y="1692476"/>
+            <a:ext cx="3573087" cy="2308324"/>
+          </a:xfrm>
+          <a:prstGeom prst="rect">
+            <a:avLst/>
+          </a:prstGeom>
+        </p:spPr>
+        <p:txBody>
+          <a:bodyPr wrap="square">
+            <a:spAutoFit/>
+          </a:bodyPr>
+          <a:lstStyle/>
+          <a:p>
+            <a:r>
+              <a:rPr lang="en-US" dirty="0" smtClean="0"/>
+              <a:t>Test corpus: 3.5 million scholarly articles published 1997-2012</a:t>
+            </a:r>
+          </a:p>
+          <a:p>
+            <a:endParaRPr lang="en-US" dirty="0"/>
+          </a:p>
+          <a:p>
+            <a:r>
+              <a:rPr lang="en-US" dirty="0" smtClean="0"/>
+              <a:t>20% had web content that was not accessible for review</a:t>
+            </a:r>
+            <a:r>
+              <a:rPr lang="en-US" dirty="0"/>
+              <a:t> </a:t>
+            </a:r>
+            <a:r>
+              <a:rPr lang="en-US" dirty="0" smtClean="0"/>
+              <a:t>(e.g. </a:t>
+            </a:r>
+            <a:r>
+              <a:rPr lang="en-US" b="1" dirty="0" smtClean="0"/>
+              <a:t>link rot, content drift</a:t>
+            </a:r>
+            <a:r>
+              <a:rPr lang="en-US" dirty="0" smtClean="0"/>
+              <a:t>)</a:t>
+            </a:r>
+          </a:p>
+          <a:p>
+            <a:endParaRPr lang="en-US" dirty="0"/>
+          </a:p>
+          <a:p>
+            <a:endParaRPr lang="en-US" dirty="0"/>
+          </a:p>
+        </p:txBody>
+      </p:sp>
+      <p:pic>
+        <p:nvPicPr>
+          <p:cNvPr id="5" name="Picture 4" descr="Screen Shot 2014-12-29 at 2.29.33 PM.png"/>
+          <p:cNvPicPr>
+            <a:picLocks noChangeAspect="1"/>
+          </p:cNvPicPr>
+          <p:nvPr/>
+        </p:nvPicPr>
+        <p:blipFill>
+          <a:blip r:embed="rId3">
+            <a:extLst>
+              <a:ext uri="{28A0092B-C50C-407E-A947-70E740481C1C}">
+                <a14:useLocalDpi xmlns:a14="http://schemas.microsoft.com/office/drawing/2010/main" val="0"/>
+              </a:ext>
+            </a:extLst>
+          </a:blip>
+          <a:stretch>
+            <a:fillRect/>
+          </a:stretch>
+        </p:blipFill>
+        <p:spPr>
+          <a:xfrm>
+            <a:off x="216468" y="1692476"/>
+            <a:ext cx="4969887" cy="2343176"/>
+          </a:xfrm>
+          <a:prstGeom prst="rect">
+            <a:avLst/>
+          </a:prstGeom>
+          <a:effectLst>
+            <a:outerShdw blurRad="50800" dist="38100" dir="2700000" algn="tl" rotWithShape="0">
+              <a:prstClr val="black">
+                <a:alpha val="40000"/>
+              </a:prstClr>
+            </a:outerShdw>
+          </a:effectLst>
+        </p:spPr>
+      </p:pic>
+      <p:sp>
+        <p:nvSpPr>
+          <p:cNvPr id="3" name="TextBox 2"/>
+          <p:cNvSpPr txBox="1"/>
+          <p:nvPr/>
+        </p:nvSpPr>
+        <p:spPr>
+          <a:xfrm>
+            <a:off x="609600" y="4470400"/>
+            <a:ext cx="8229600" cy="1200328"/>
+          </a:xfrm>
+          <a:prstGeom prst="rect">
+            <a:avLst/>
+          </a:prstGeom>
+          <a:noFill/>
+        </p:spPr>
+        <p:txBody>
+          <a:bodyPr wrap="square" rtlCol="0">
+            <a:spAutoFit/>
+          </a:bodyPr>
+          <a:lstStyle/>
+          <a:p>
+            <a:pPr algn="ctr"/>
+            <a:r>
+              <a:rPr lang="en-US" sz="2400" dirty="0"/>
+              <a:t>If data are playing a role of evidence… we need to make sure that they are </a:t>
+            </a:r>
+            <a:r>
+              <a:rPr lang="en-US" sz="2400" dirty="0" smtClean="0"/>
+              <a:t>stable and accessible </a:t>
+            </a:r>
+            <a:r>
+              <a:rPr lang="en-US" sz="2400" dirty="0"/>
+              <a:t>for the long-term</a:t>
+            </a:r>
+          </a:p>
+          <a:p>
+            <a:pPr algn="ctr"/>
+            <a:endParaRPr lang="en-US" sz="2400" dirty="0"/>
+          </a:p>
+        </p:txBody>
+      </p:sp>
+    </p:spTree>
+    <p:extLst>
+      <p:ext uri="{BB962C8B-B14F-4D97-AF65-F5344CB8AC3E}">
+        <p14:creationId xmlns:p14="http://schemas.microsoft.com/office/powerpoint/2010/main" val="3160640283"/>
+      </p:ext>
+    </p:extLst>
+  </p:cSld>
+  <p:clrMapOvr>
+    <a:masterClrMapping/>
+  </p:clrMapOvr>
+</p:sld>
+</file>
+
+<file path=ppt/slides/slide5.xml><?xml version="1.0" encoding="utf-8"?>
+<p:sld xmlns:a="http://schemas.openxmlformats.org/drawingml/2006/main" xmlns:r="http://schemas.openxmlformats.org/officeDocument/2006/relationships" xmlns:p="http://schemas.openxmlformats.org/presentationml/2006/main">
+  <p:cSld>
+    <p:spTree>
+      <p:nvGrpSpPr>
+        <p:cNvPr id="1" name=""/>
+        <p:cNvGrpSpPr/>
+        <p:nvPr/>
+      </p:nvGrpSpPr>
+      <p:grpSpPr>
+        <a:xfrm>
+          <a:off x="0" y="0"/>
+          <a:ext cx="0" cy="0"/>
+          <a:chOff x="0" y="0"/>
+          <a:chExt cx="0" cy="0"/>
+        </a:xfrm>
+      </p:grpSpPr>
+      <p:sp>
+        <p:nvSpPr>
+          <p:cNvPr id="2" name="Title 1"/>
+          <p:cNvSpPr>
+            <a:spLocks noGrp="1"/>
+          </p:cNvSpPr>
+          <p:nvPr>
+            <p:ph type="title"/>
+          </p:nvPr>
+        </p:nvSpPr>
+        <p:spPr/>
+        <p:txBody>
+          <a:bodyPr>
+            <a:normAutofit fontScale="90000"/>
+          </a:bodyPr>
+          <a:lstStyle/>
+          <a:p>
+            <a:r>
+              <a:rPr lang="en-US" dirty="0" smtClean="0"/>
+              <a:t>Qualities of an ID for data curation</a:t>
+            </a:r>
+            <a:endParaRPr lang="en-US" dirty="0"/>
+          </a:p>
+        </p:txBody>
+      </p:sp>
+      <p:sp>
+        <p:nvSpPr>
+          <p:cNvPr id="3" name="Content Placeholder 2"/>
+          <p:cNvSpPr>
+            <a:spLocks noGrp="1"/>
+          </p:cNvSpPr>
+          <p:nvPr>
+            <p:ph idx="1"/>
+          </p:nvPr>
+        </p:nvSpPr>
+        <p:spPr/>
+        <p:txBody>
+          <a:bodyPr/>
+          <a:lstStyle/>
+          <a:p>
+            <a:r>
+              <a:rPr lang="en-US" dirty="0" smtClean="0"/>
+              <a:t>Machine Readable</a:t>
+            </a:r>
+          </a:p>
+          <a:p>
+            <a:r>
+              <a:rPr lang="en-US" dirty="0" smtClean="0"/>
+              <a:t>Unique</a:t>
+            </a:r>
+          </a:p>
+          <a:p>
+            <a:r>
+              <a:rPr lang="en-US" dirty="0" smtClean="0"/>
+              <a:t>Persistent</a:t>
+            </a:r>
+          </a:p>
+          <a:p>
+            <a:r>
+              <a:rPr lang="en-US" dirty="0" smtClean="0"/>
+              <a:t>Resolvable</a:t>
+            </a:r>
+          </a:p>
+          <a:p>
+            <a:pPr marL="0" indent="0">
+              <a:buNone/>
+            </a:pPr>
+            <a:endParaRPr lang="en-US" dirty="0" smtClean="0"/>
+          </a:p>
+        </p:txBody>
+      </p:sp>
+    </p:spTree>
+    <p:extLst>
+      <p:ext uri="{BB962C8B-B14F-4D97-AF65-F5344CB8AC3E}">
+        <p14:creationId xmlns:p14="http://schemas.microsoft.com/office/powerpoint/2010/main" val="2369558882"/>
+      </p:ext>
+    </p:extLst>
+  </p:cSld>
+  <p:clrMapOvr>
+    <a:masterClrMapping/>
+  </p:clrMapOvr>
+  <p:timing>
+    <p:tnLst>
+      <p:par>
+        <p:cTn xmlns:p14="http://schemas.microsoft.com/office/powerpoint/2010/main" id="1" dur="indefinite" restart="never" nodeType="tmRoot"/>
+      </p:par>
+    </p:tnLst>
+  </p:timing>
+</p:sld>
+</file>
+
+<file path=ppt/slides/slide6.xml><?xml version="1.0" encoding="utf-8"?>
+<p:sld xmlns:a="http://schemas.openxmlformats.org/drawingml/2006/main" xmlns:r="http://schemas.openxmlformats.org/officeDocument/2006/relationships" xmlns:p="http://schemas.openxmlformats.org/presentationml/2006/main">
+  <p:cSld>
+    <p:spTree>
+      <p:nvGrpSpPr>
+        <p:cNvPr id="1" name=""/>
+        <p:cNvGrpSpPr/>
+        <p:nvPr/>
+      </p:nvGrpSpPr>
+      <p:grpSpPr>
+        <a:xfrm>
+          <a:off x="0" y="0"/>
+          <a:ext cx="0" cy="0"/>
+          <a:chOff x="0" y="0"/>
+          <a:chExt cx="0" cy="0"/>
+        </a:xfrm>
+      </p:grpSpPr>
+      <p:sp>
+        <p:nvSpPr>
+          <p:cNvPr id="2" name="Title 1"/>
+          <p:cNvSpPr>
+            <a:spLocks noGrp="1"/>
+          </p:cNvSpPr>
+          <p:nvPr>
+            <p:ph type="title"/>
+          </p:nvPr>
+        </p:nvSpPr>
+        <p:spPr/>
+        <p:txBody>
+          <a:bodyPr/>
+          <a:lstStyle/>
+          <a:p>
+            <a:r>
+              <a:rPr lang="en-US" dirty="0" smtClean="0"/>
+              <a:t>Example Schemas</a:t>
+            </a:r>
+            <a:endParaRPr lang="en-US" dirty="0"/>
+          </a:p>
+        </p:txBody>
+      </p:sp>
+      <p:sp>
+        <p:nvSpPr>
+          <p:cNvPr id="3" name="Content Placeholder 2"/>
+          <p:cNvSpPr>
+            <a:spLocks noGrp="1"/>
+          </p:cNvSpPr>
+          <p:nvPr>
+            <p:ph idx="1"/>
+          </p:nvPr>
+        </p:nvSpPr>
+        <p:spPr>
+          <a:xfrm>
+            <a:off x="457200" y="1600201"/>
+            <a:ext cx="8229600" cy="3594707"/>
+          </a:xfrm>
+        </p:spPr>
+        <p:txBody>
+          <a:bodyPr numCol="2">
+            <a:noAutofit/>
+          </a:bodyPr>
+          <a:lstStyle/>
+          <a:p>
+            <a:pPr marL="0" indent="0">
+              <a:buNone/>
+            </a:pPr>
+            <a:r>
+              <a:rPr lang="en-US" sz="2000" dirty="0"/>
+              <a:t>Archival Resource Keys (ARKs)</a:t>
+            </a:r>
+          </a:p>
+          <a:p>
+            <a:pPr marL="0" indent="0">
+              <a:buNone/>
+            </a:pPr>
+            <a:endParaRPr lang="en-US" sz="2000" dirty="0"/>
+          </a:p>
+          <a:p>
+            <a:pPr marL="0" indent="0">
+              <a:buNone/>
+            </a:pPr>
+            <a:r>
+              <a:rPr lang="en-US" sz="2000" b="1" dirty="0"/>
+              <a:t>Digital Object Identifiers (DOIs)</a:t>
+            </a:r>
+          </a:p>
+          <a:p>
+            <a:pPr marL="0" indent="0">
+              <a:buNone/>
+            </a:pPr>
+            <a:endParaRPr lang="en-US" sz="2000" dirty="0"/>
+          </a:p>
+          <a:p>
+            <a:pPr marL="0" indent="0">
+              <a:buNone/>
+            </a:pPr>
+            <a:r>
+              <a:rPr lang="en-US" sz="2000" dirty="0"/>
+              <a:t>Extensible Resource Identifiers (XRIs)</a:t>
+            </a:r>
+          </a:p>
+          <a:p>
+            <a:pPr marL="0" indent="0">
+              <a:buNone/>
+            </a:pPr>
+            <a:endParaRPr lang="en-US" sz="2000" dirty="0"/>
+          </a:p>
+          <a:p>
+            <a:pPr marL="0" indent="0">
+              <a:buNone/>
+            </a:pPr>
+            <a:r>
+              <a:rPr lang="en-US" sz="2000" dirty="0"/>
+              <a:t>Handle System (Handles)</a:t>
+            </a:r>
+          </a:p>
+          <a:p>
+            <a:pPr marL="0" indent="0">
+              <a:buNone/>
+            </a:pPr>
+            <a:endParaRPr lang="en-US" sz="2000" dirty="0"/>
+          </a:p>
+          <a:p>
+            <a:pPr marL="0" indent="0">
+              <a:buNone/>
+            </a:pPr>
+            <a:r>
+              <a:rPr lang="en-US" sz="2000" dirty="0"/>
+              <a:t>Life Science Unique Identifiers (LSIDs</a:t>
+            </a:r>
+            <a:r>
+              <a:rPr lang="en-US" sz="2000" dirty="0" smtClean="0"/>
+              <a:t>)</a:t>
+            </a:r>
+            <a:endParaRPr lang="en-US" sz="2000" dirty="0"/>
+          </a:p>
+          <a:p>
+            <a:pPr marL="0" indent="0">
+              <a:buNone/>
+            </a:pPr>
+            <a:r>
+              <a:rPr lang="en-US" sz="2000" dirty="0"/>
+              <a:t>Object Identifiers (OIDs)</a:t>
+            </a:r>
+          </a:p>
+          <a:p>
+            <a:pPr marL="0" indent="0">
+              <a:buNone/>
+            </a:pPr>
+            <a:endParaRPr lang="en-US" sz="2000" dirty="0"/>
+          </a:p>
+          <a:p>
+            <a:pPr marL="0" indent="0">
+              <a:buNone/>
+            </a:pPr>
+            <a:r>
+              <a:rPr lang="en-US" sz="2000" dirty="0"/>
+              <a:t>Persistent Uniform Resource Locators (PURLs</a:t>
+            </a:r>
+            <a:r>
+              <a:rPr lang="en-US" sz="2000" dirty="0" smtClean="0"/>
+              <a:t>)</a:t>
+            </a:r>
+          </a:p>
+          <a:p>
+            <a:pPr marL="0" indent="0">
+              <a:buNone/>
+            </a:pPr>
+            <a:endParaRPr lang="en-US" sz="2000" dirty="0"/>
+          </a:p>
+          <a:p>
+            <a:pPr marL="0" indent="0">
+              <a:buNone/>
+            </a:pPr>
+            <a:r>
+              <a:rPr lang="en-US" sz="2000" dirty="0"/>
+              <a:t>Uniform Resource Identifiers/Names/Locators (URIs</a:t>
+            </a:r>
+            <a:r>
+              <a:rPr lang="en-US" sz="2000" dirty="0" smtClean="0"/>
+              <a:t>/ URNs</a:t>
+            </a:r>
+            <a:r>
+              <a:rPr lang="en-US" sz="2000" dirty="0"/>
+              <a:t>/URLs</a:t>
+            </a:r>
+            <a:r>
+              <a:rPr lang="en-US" sz="2000" dirty="0" smtClean="0"/>
+              <a:t>)</a:t>
+            </a:r>
+          </a:p>
+          <a:p>
+            <a:pPr marL="0" indent="0">
+              <a:buNone/>
+            </a:pPr>
+            <a:endParaRPr lang="en-US" sz="2000" dirty="0" smtClean="0"/>
+          </a:p>
+          <a:p>
+            <a:pPr marL="0" indent="0">
+              <a:buNone/>
+            </a:pPr>
+            <a:r>
+              <a:rPr lang="en-US" sz="2000" dirty="0" smtClean="0"/>
+              <a:t>Universally </a:t>
+            </a:r>
+            <a:r>
+              <a:rPr lang="en-US" sz="2000" dirty="0"/>
+              <a:t>Unique Identifiers (UUIDs</a:t>
+            </a:r>
+            <a:r>
+              <a:rPr lang="en-US" sz="2000" dirty="0" smtClean="0"/>
+              <a:t>)</a:t>
+            </a:r>
+            <a:endParaRPr lang="en-US" sz="2000" dirty="0"/>
+          </a:p>
+        </p:txBody>
+      </p:sp>
+    </p:spTree>
+    <p:extLst>
+      <p:ext uri="{BB962C8B-B14F-4D97-AF65-F5344CB8AC3E}">
+        <p14:creationId xmlns:p14="http://schemas.microsoft.com/office/powerpoint/2010/main" val="2715794482"/>
+      </p:ext>
+    </p:extLst>
+  </p:cSld>
+  <p:clrMapOvr>
+    <a:masterClrMapping/>
+  </p:clrMapOvr>
+</p:sld>
+</file>
+
+<file path=ppt/slides/slide7.xml><?xml version="1.0" encoding="utf-8"?>
+<p:sld xmlns:a="http://schemas.openxmlformats.org/drawingml/2006/main" xmlns:r="http://schemas.openxmlformats.org/officeDocument/2006/relationships" xmlns:p="http://schemas.openxmlformats.org/presentationml/2006/main">
+  <p:cSld>
+    <p:spTree>
+      <p:nvGrpSpPr>
+        <p:cNvPr id="1" name=""/>
+        <p:cNvGrpSpPr/>
+        <p:nvPr/>
+      </p:nvGrpSpPr>
+      <p:grpSpPr>
+        <a:xfrm>
+          <a:off x="0" y="0"/>
+          <a:ext cx="0" cy="0"/>
+          <a:chOff x="0" y="0"/>
+          <a:chExt cx="0" cy="0"/>
+        </a:xfrm>
+      </p:grpSpPr>
+      <p:sp>
+        <p:nvSpPr>
+          <p:cNvPr id="2" name="Title 1"/>
+          <p:cNvSpPr>
+            <a:spLocks noGrp="1"/>
+          </p:cNvSpPr>
+          <p:nvPr>
+            <p:ph type="title"/>
+          </p:nvPr>
+        </p:nvSpPr>
+        <p:spPr/>
+        <p:txBody>
+          <a:bodyPr/>
+          <a:lstStyle/>
+          <a:p>
+            <a:r>
+              <a:rPr lang="en-US" dirty="0" smtClean="0"/>
+              <a:t>Values of different ID schemes</a:t>
+            </a:r>
+            <a:endParaRPr lang="en-US" dirty="0"/>
+          </a:p>
+        </p:txBody>
+      </p:sp>
+      <p:sp>
+        <p:nvSpPr>
+          <p:cNvPr id="3" name="Content Placeholder 2"/>
+          <p:cNvSpPr>
+            <a:spLocks noGrp="1"/>
+          </p:cNvSpPr>
+          <p:nvPr>
+            <p:ph idx="1"/>
+          </p:nvPr>
+        </p:nvSpPr>
+        <p:spPr>
+          <a:xfrm>
+            <a:off x="457200" y="1880792"/>
+            <a:ext cx="8229600" cy="4525963"/>
+          </a:xfrm>
+        </p:spPr>
+        <p:txBody>
+          <a:bodyPr>
+            <a:normAutofit/>
+          </a:bodyPr>
+          <a:lstStyle/>
+          <a:p>
+            <a:pPr marL="0" indent="0">
+              <a:buNone/>
+            </a:pPr>
+            <a:r>
+              <a:rPr lang="en-US" sz="2300" b="1" dirty="0"/>
+              <a:t>Technical </a:t>
+            </a:r>
+            <a:r>
+              <a:rPr lang="en-US" sz="2300" b="1" dirty="0" smtClean="0"/>
+              <a:t>value</a:t>
+            </a:r>
+            <a:r>
+              <a:rPr lang="en-US" sz="2300" dirty="0" smtClean="0"/>
+              <a:t>: assessing </a:t>
+            </a:r>
+            <a:r>
+              <a:rPr lang="en-US" sz="2300" dirty="0"/>
+              <a:t>the technology </a:t>
+            </a:r>
+            <a:r>
+              <a:rPr lang="en-US" sz="2300" dirty="0" smtClean="0"/>
+              <a:t>underlying the </a:t>
+            </a:r>
+            <a:r>
+              <a:rPr lang="en-US" sz="2300" dirty="0"/>
+              <a:t>identifier scheme</a:t>
+            </a:r>
+            <a:r>
+              <a:rPr lang="en-US" sz="2300" dirty="0" smtClean="0"/>
+              <a:t>; </a:t>
+            </a:r>
+          </a:p>
+          <a:p>
+            <a:pPr marL="0" indent="0">
+              <a:buNone/>
+            </a:pPr>
+            <a:endParaRPr lang="en-US" sz="2300" dirty="0" smtClean="0"/>
+          </a:p>
+          <a:p>
+            <a:pPr marL="0" indent="0">
+              <a:buNone/>
+            </a:pPr>
+            <a:r>
+              <a:rPr lang="en-US" sz="2300" b="1" dirty="0" smtClean="0"/>
+              <a:t>User value</a:t>
+            </a:r>
+            <a:r>
+              <a:rPr lang="en-US" sz="2300" dirty="0" smtClean="0"/>
+              <a:t>: assessing </a:t>
+            </a:r>
+            <a:r>
+              <a:rPr lang="en-US" sz="2300" dirty="0"/>
+              <a:t>how the scheme is likely to </a:t>
+            </a:r>
+            <a:r>
+              <a:rPr lang="en-US" sz="2300" dirty="0" smtClean="0"/>
+              <a:t>make end user’s </a:t>
+            </a:r>
+            <a:r>
+              <a:rPr lang="en-US" sz="2300" dirty="0"/>
+              <a:t>lives easier or more difficult; and</a:t>
+            </a:r>
+          </a:p>
+          <a:p>
+            <a:pPr marL="0" indent="0">
+              <a:buNone/>
+            </a:pPr>
+            <a:endParaRPr lang="en-US" sz="2300" dirty="0"/>
+          </a:p>
+          <a:p>
+            <a:pPr marL="0" indent="0">
+              <a:buNone/>
+            </a:pPr>
+            <a:r>
+              <a:rPr lang="en-US" sz="2300" b="1" dirty="0"/>
+              <a:t>Archive </a:t>
+            </a:r>
+            <a:r>
+              <a:rPr lang="en-US" sz="2300" b="1" dirty="0" smtClean="0"/>
+              <a:t>value: </a:t>
+            </a:r>
+            <a:r>
+              <a:rPr lang="en-US" sz="2300" dirty="0" smtClean="0"/>
+              <a:t>assessing </a:t>
+            </a:r>
+            <a:r>
+              <a:rPr lang="en-US" sz="2300" dirty="0"/>
+              <a:t>whether an identifier scheme </a:t>
+            </a:r>
+            <a:r>
+              <a:rPr lang="en-US" sz="2300" dirty="0" smtClean="0"/>
+              <a:t>is likely </a:t>
+            </a:r>
+            <a:r>
+              <a:rPr lang="en-US" sz="2300" dirty="0"/>
+              <a:t>to make the job of data management easier </a:t>
+            </a:r>
+            <a:r>
+              <a:rPr lang="en-US" sz="2300" dirty="0" smtClean="0"/>
+              <a:t>or more </a:t>
+            </a:r>
+            <a:r>
+              <a:rPr lang="en-US" sz="2300" dirty="0"/>
+              <a:t>complicated</a:t>
+            </a:r>
+          </a:p>
+          <a:p>
+            <a:pPr marL="0" indent="0">
+              <a:buNone/>
+            </a:pPr>
+            <a:endParaRPr lang="en-US" sz="2000" dirty="0"/>
+          </a:p>
+        </p:txBody>
+      </p:sp>
+      <p:sp>
+        <p:nvSpPr>
+          <p:cNvPr id="4" name="Rectangle 3"/>
+          <p:cNvSpPr/>
+          <p:nvPr/>
+        </p:nvSpPr>
+        <p:spPr>
+          <a:xfrm>
+            <a:off x="6178752" y="5217064"/>
+            <a:ext cx="4572000" cy="369332"/>
+          </a:xfrm>
+          <a:prstGeom prst="rect">
+            <a:avLst/>
+          </a:prstGeom>
+        </p:spPr>
+        <p:txBody>
+          <a:bodyPr>
+            <a:spAutoFit/>
+          </a:bodyPr>
+          <a:lstStyle/>
+          <a:p>
+            <a:r>
+              <a:rPr lang="en-US" dirty="0" smtClean="0"/>
+              <a:t>Duerr, et al. 2011</a:t>
+            </a:r>
+            <a:endParaRPr lang="en-US" dirty="0"/>
+          </a:p>
+        </p:txBody>
+      </p:sp>
+    </p:spTree>
+    <p:extLst>
+      <p:ext uri="{BB962C8B-B14F-4D97-AF65-F5344CB8AC3E}">
+        <p14:creationId xmlns:p14="http://schemas.microsoft.com/office/powerpoint/2010/main" val="109018710"/>
+      </p:ext>
+    </p:extLst>
+  </p:cSld>
+  <p:clrMapOvr>
+    <a:masterClrMapping/>
+  </p:clrMapOvr>
+  <p:timing>
+    <p:tnLst>
+      <p:par>
+        <p:cTn xmlns:p14="http://schemas.microsoft.com/office/powerpoint/2010/main" id="1" dur="indefinite" restart="never" nodeType="tmRoot"/>
+      </p:par>
+    </p:tnLst>
+  </p:timing>
+</p:sld>
+</file>
+
+<file path=ppt/slides/slide8.xml><?xml version="1.0" encoding="utf-8"?>
+<p:sld xmlns:a="http://schemas.openxmlformats.org/drawingml/2006/main" xmlns:r="http://schemas.openxmlformats.org/officeDocument/2006/relationships" xmlns:p="http://schemas.openxmlformats.org/presentationml/2006/main">
+  <p:cSld>
+    <p:spTree>
+      <p:nvGrpSpPr>
+        <p:cNvPr id="1" name=""/>
+        <p:cNvGrpSpPr/>
+        <p:nvPr/>
+      </p:nvGrpSpPr>
+      <p:grpSpPr>
+        <a:xfrm>
+          <a:off x="0" y="0"/>
+          <a:ext cx="0" cy="0"/>
+          <a:chOff x="0" y="0"/>
+          <a:chExt cx="0" cy="0"/>
+        </a:xfrm>
+      </p:grpSpPr>
+      <p:sp>
+        <p:nvSpPr>
+          <p:cNvPr id="2" name="Title 1"/>
+          <p:cNvSpPr>
+            <a:spLocks noGrp="1"/>
+          </p:cNvSpPr>
+          <p:nvPr>
+            <p:ph type="title"/>
+          </p:nvPr>
+        </p:nvSpPr>
+        <p:spPr>
+          <a:xfrm>
+            <a:off x="457200" y="72614"/>
+            <a:ext cx="8229600" cy="1143000"/>
+          </a:xfrm>
+        </p:spPr>
+        <p:txBody>
+          <a:bodyPr>
+            <a:normAutofit/>
+          </a:bodyPr>
+          <a:lstStyle/>
+          <a:p>
+            <a:r>
+              <a:rPr lang="en-US" sz="2000" dirty="0" smtClean="0"/>
+              <a:t>Evaluating different ID schemas</a:t>
+            </a:r>
+            <a:endParaRPr lang="en-US" sz="2000" dirty="0"/>
+          </a:p>
+        </p:txBody>
+      </p:sp>
+      <p:pic>
+        <p:nvPicPr>
+          <p:cNvPr id="4" name="Picture 3" descr="Screen Shot 2014-12-29 at 2.13.08 PM.png"/>
+          <p:cNvPicPr>
+            <a:picLocks noChangeAspect="1"/>
+          </p:cNvPicPr>
+          <p:nvPr/>
+        </p:nvPicPr>
+        <p:blipFill>
+          <a:blip r:embed="rId2">
+            <a:extLst>
+              <a:ext uri="{28A0092B-C50C-407E-A947-70E740481C1C}">
+                <a14:useLocalDpi xmlns:a14="http://schemas.microsoft.com/office/drawing/2010/main" val="0"/>
+              </a:ext>
+            </a:extLst>
+          </a:blip>
+          <a:stretch>
+            <a:fillRect/>
+          </a:stretch>
+        </p:blipFill>
+        <p:spPr>
+          <a:xfrm>
+            <a:off x="1082344" y="1417638"/>
+            <a:ext cx="6522924" cy="3238462"/>
+          </a:xfrm>
+          <a:prstGeom prst="rect">
+            <a:avLst/>
+          </a:prstGeom>
+        </p:spPr>
+      </p:pic>
+      <p:pic>
+        <p:nvPicPr>
+          <p:cNvPr id="5" name="Picture 4" descr="Screen Shot 2014-12-29 at 2.13.18 PM.png"/>
+          <p:cNvPicPr>
+            <a:picLocks noChangeAspect="1"/>
+          </p:cNvPicPr>
+          <p:nvPr/>
+        </p:nvPicPr>
+        <p:blipFill>
+          <a:blip r:embed="rId3">
+            <a:extLst>
+              <a:ext uri="{28A0092B-C50C-407E-A947-70E740481C1C}">
+                <a14:useLocalDpi xmlns:a14="http://schemas.microsoft.com/office/drawing/2010/main" val="0"/>
+              </a:ext>
+            </a:extLst>
+          </a:blip>
+          <a:stretch>
+            <a:fillRect/>
+          </a:stretch>
+        </p:blipFill>
+        <p:spPr>
+          <a:xfrm>
+            <a:off x="457200" y="4949229"/>
+            <a:ext cx="7937187" cy="400194"/>
+          </a:xfrm>
+          <a:prstGeom prst="rect">
+            <a:avLst/>
+          </a:prstGeom>
+        </p:spPr>
+      </p:pic>
+      <p:sp>
+        <p:nvSpPr>
+          <p:cNvPr id="6" name="TextBox 5"/>
+          <p:cNvSpPr txBox="1"/>
+          <p:nvPr/>
+        </p:nvSpPr>
+        <p:spPr>
+          <a:xfrm>
+            <a:off x="6417733" y="5349423"/>
+            <a:ext cx="2607734" cy="369332"/>
+          </a:xfrm>
+          <a:prstGeom prst="rect">
+            <a:avLst/>
+          </a:prstGeom>
+          <a:noFill/>
+        </p:spPr>
+        <p:txBody>
+          <a:bodyPr wrap="square" rtlCol="0">
+            <a:spAutoFit/>
+          </a:bodyPr>
+          <a:lstStyle/>
+          <a:p>
+            <a:r>
+              <a:rPr lang="en-US" dirty="0" smtClean="0"/>
+              <a:t>Reference?</a:t>
+            </a:r>
+            <a:endParaRPr lang="en-US" dirty="0"/>
+          </a:p>
+        </p:txBody>
+      </p:sp>
+    </p:spTree>
+    <p:extLst>
+      <p:ext uri="{BB962C8B-B14F-4D97-AF65-F5344CB8AC3E}">
+        <p14:creationId xmlns:p14="http://schemas.microsoft.com/office/powerpoint/2010/main" val="3614893756"/>
+      </p:ext>
+    </p:extLst>
+  </p:cSld>
+  <p:clrMapOvr>
+    <a:masterClrMapping/>
+  </p:clrMapOvr>
+</p:sld>
+</file>
+
+<file path=ppt/slides/slide9.xml><?xml version="1.0" encoding="utf-8"?>
+<p:sld xmlns:a="http://schemas.openxmlformats.org/drawingml/2006/main" xmlns:r="http://schemas.openxmlformats.org/officeDocument/2006/relationships" xmlns:p="http://schemas.openxmlformats.org/presentationml/2006/main">
+  <p:cSld>
+    <p:spTree>
+      <p:nvGrpSpPr>
+        <p:cNvPr id="1" name=""/>
+        <p:cNvGrpSpPr/>
+        <p:nvPr/>
+      </p:nvGrpSpPr>
+      <p:grpSpPr>
+        <a:xfrm>
+          <a:off x="0" y="0"/>
+          <a:ext cx="0" cy="0"/>
+          <a:chOff x="0" y="0"/>
+          <a:chExt cx="0" cy="0"/>
+        </a:xfrm>
+      </p:grpSpPr>
+      <p:sp>
+        <p:nvSpPr>
+          <p:cNvPr id="2" name="Title 1"/>
+          <p:cNvSpPr>
+            <a:spLocks noGrp="1"/>
+          </p:cNvSpPr>
+          <p:nvPr>
+            <p:ph type="title"/>
+          </p:nvPr>
+        </p:nvSpPr>
+        <p:spPr>
+          <a:xfrm>
+            <a:off x="457200" y="72614"/>
+            <a:ext cx="8229600" cy="1143000"/>
+          </a:xfrm>
+        </p:spPr>
+        <p:txBody>
+          <a:bodyPr>
+            <a:normAutofit/>
+          </a:bodyPr>
+          <a:lstStyle/>
+          <a:p>
+            <a:r>
+              <a:rPr lang="en-US" sz="2000" dirty="0" smtClean="0"/>
+              <a:t>Evaluating different ID schemas</a:t>
+            </a:r>
+            <a:endParaRPr lang="en-US" sz="2000" dirty="0"/>
+          </a:p>
+        </p:txBody>
+      </p:sp>
+      <p:pic>
+        <p:nvPicPr>
+          <p:cNvPr id="4" name="Picture 3" descr="Screen Shot 2014-12-29 at 2.13.08 PM.png"/>
+          <p:cNvPicPr>
+            <a:picLocks noChangeAspect="1"/>
+          </p:cNvPicPr>
+          <p:nvPr/>
+        </p:nvPicPr>
+        <p:blipFill>
+          <a:blip r:embed="rId2">
+            <a:extLst>
+              <a:ext uri="{28A0092B-C50C-407E-A947-70E740481C1C}">
+                <a14:useLocalDpi xmlns:a14="http://schemas.microsoft.com/office/drawing/2010/main" val="0"/>
+              </a:ext>
+            </a:extLst>
+          </a:blip>
+          <a:stretch>
+            <a:fillRect/>
+          </a:stretch>
+        </p:blipFill>
+        <p:spPr>
+          <a:xfrm>
+            <a:off x="1082344" y="1417638"/>
+            <a:ext cx="6522924" cy="3238462"/>
+          </a:xfrm>
+          <a:prstGeom prst="rect">
+            <a:avLst/>
+          </a:prstGeom>
+        </p:spPr>
+      </p:pic>
+      <p:pic>
+        <p:nvPicPr>
+          <p:cNvPr id="5" name="Picture 4" descr="Screen Shot 2014-12-29 at 2.13.18 PM.png"/>
+          <p:cNvPicPr>
+            <a:picLocks noChangeAspect="1"/>
+          </p:cNvPicPr>
+          <p:nvPr/>
+        </p:nvPicPr>
+        <p:blipFill>
+          <a:blip r:embed="rId3">
+            <a:extLst>
+              <a:ext uri="{28A0092B-C50C-407E-A947-70E740481C1C}">
+                <a14:useLocalDpi xmlns:a14="http://schemas.microsoft.com/office/drawing/2010/main" val="0"/>
+              </a:ext>
+            </a:extLst>
+          </a:blip>
+          <a:stretch>
+            <a:fillRect/>
+          </a:stretch>
+        </p:blipFill>
+        <p:spPr>
+          <a:xfrm>
+            <a:off x="457200" y="4949229"/>
+            <a:ext cx="7937187" cy="400194"/>
+          </a:xfrm>
+          <a:prstGeom prst="rect">
+            <a:avLst/>
+          </a:prstGeom>
+        </p:spPr>
+      </p:pic>
+      <p:sp>
+        <p:nvSpPr>
+          <p:cNvPr id="3" name="Frame 2"/>
+          <p:cNvSpPr/>
+          <p:nvPr/>
+        </p:nvSpPr>
+        <p:spPr>
+          <a:xfrm>
+            <a:off x="1200876" y="2380928"/>
+            <a:ext cx="6316692" cy="368945"/>
+          </a:xfrm>
+          <a:prstGeom prst="frame">
+            <a:avLst/>
+          </a:prstGeom>
+          <a:solidFill>
+            <a:srgbClr val="FF0000"/>
+          </a:solidFill>
+          <a:ln>
+            <a:solidFill>
+              <a:srgbClr val="FF0000"/>
+            </a:solidFill>
+          </a:ln>
+        </p:spPr>
+        <p:style>
+          <a:lnRef idx="1">
+            <a:schemeClr val="accent1"/>
+          </a:lnRef>
+          <a:fillRef idx="3">
+            <a:schemeClr val="accent1"/>
+          </a:fillRef>
+          <a:effectRef idx="2">
+            <a:schemeClr val="accent1"/>
+          </a:effectRef>
+          <a:fontRef idx="minor">
+            <a:schemeClr val="lt1"/>
+          </a:fontRef>
+        </p:style>
+        <p:txBody>
+          <a:bodyPr rtlCol="0" anchor="ctr"/>
+          <a:lstStyle/>
+          <a:p>
+            <a:pPr algn="ctr"/>
+            <a:endParaRPr lang="en-US">
+              <a:solidFill>
+                <a:schemeClr val="tx1"/>
+              </a:solidFill>
+            </a:endParaRPr>
+          </a:p>
+        </p:txBody>
+      </p:sp>
+    </p:spTree>
+    <p:extLst>
+      <p:ext uri="{BB962C8B-B14F-4D97-AF65-F5344CB8AC3E}">
+        <p14:creationId xmlns:p14="http://schemas.microsoft.com/office/powerpoint/2010/main" val="1147977069"/>
       </p:ext>
     </p:extLst>
   </p:cSld>

</xml_diff>

<commit_message>
whole lotta edits mostly day 1
</commit_message>
<xml_diff>
--- a/Day_1/Lectures/Slides/Day_1_Lecture_Identifier.pptx
+++ b/Day_1/Lectures/Slides/Day_1_Lecture_Identifier.pptx
@@ -209,7 +209,7 @@
           <a:p>
             <a:fld id="{F812B0B4-9C1E-C84F-91DC-C94EF554C0AE}" type="datetimeFigureOut">
               <a:rPr lang="en-US" smtClean="0"/>
-              <a:t>1/31/15</a:t>
+              <a:t>2/1/15</a:t>
             </a:fld>
             <a:endParaRPr lang="en-US"/>
           </a:p>
@@ -981,7 +981,7 @@
           <a:p>
             <a:fld id="{9D6228D5-5F93-BB4A-964B-203967C46295}" type="datetimeFigureOut">
               <a:rPr lang="en-US" smtClean="0"/>
-              <a:t>1/31/15</a:t>
+              <a:t>2/1/15</a:t>
             </a:fld>
             <a:endParaRPr lang="en-US"/>
           </a:p>
@@ -1151,7 +1151,7 @@
           <a:p>
             <a:fld id="{9D6228D5-5F93-BB4A-964B-203967C46295}" type="datetimeFigureOut">
               <a:rPr lang="en-US" smtClean="0"/>
-              <a:t>1/31/15</a:t>
+              <a:t>2/1/15</a:t>
             </a:fld>
             <a:endParaRPr lang="en-US"/>
           </a:p>
@@ -1331,7 +1331,7 @@
           <a:p>
             <a:fld id="{9D6228D5-5F93-BB4A-964B-203967C46295}" type="datetimeFigureOut">
               <a:rPr lang="en-US" smtClean="0"/>
-              <a:t>1/31/15</a:t>
+              <a:t>2/1/15</a:t>
             </a:fld>
             <a:endParaRPr lang="en-US"/>
           </a:p>
@@ -1501,7 +1501,7 @@
           <a:p>
             <a:fld id="{9D6228D5-5F93-BB4A-964B-203967C46295}" type="datetimeFigureOut">
               <a:rPr lang="en-US" smtClean="0"/>
-              <a:t>1/31/15</a:t>
+              <a:t>2/1/15</a:t>
             </a:fld>
             <a:endParaRPr lang="en-US"/>
           </a:p>
@@ -1747,7 +1747,7 @@
           <a:p>
             <a:fld id="{9D6228D5-5F93-BB4A-964B-203967C46295}" type="datetimeFigureOut">
               <a:rPr lang="en-US" smtClean="0"/>
-              <a:t>1/31/15</a:t>
+              <a:t>2/1/15</a:t>
             </a:fld>
             <a:endParaRPr lang="en-US"/>
           </a:p>
@@ -2035,7 +2035,7 @@
           <a:p>
             <a:fld id="{9D6228D5-5F93-BB4A-964B-203967C46295}" type="datetimeFigureOut">
               <a:rPr lang="en-US" smtClean="0"/>
-              <a:t>1/31/15</a:t>
+              <a:t>2/1/15</a:t>
             </a:fld>
             <a:endParaRPr lang="en-US"/>
           </a:p>
@@ -2457,7 +2457,7 @@
           <a:p>
             <a:fld id="{9D6228D5-5F93-BB4A-964B-203967C46295}" type="datetimeFigureOut">
               <a:rPr lang="en-US" smtClean="0"/>
-              <a:t>1/31/15</a:t>
+              <a:t>2/1/15</a:t>
             </a:fld>
             <a:endParaRPr lang="en-US"/>
           </a:p>
@@ -2575,7 +2575,7 @@
           <a:p>
             <a:fld id="{9D6228D5-5F93-BB4A-964B-203967C46295}" type="datetimeFigureOut">
               <a:rPr lang="en-US" smtClean="0"/>
-              <a:t>1/31/15</a:t>
+              <a:t>2/1/15</a:t>
             </a:fld>
             <a:endParaRPr lang="en-US"/>
           </a:p>
@@ -2670,7 +2670,7 @@
           <a:p>
             <a:fld id="{9D6228D5-5F93-BB4A-964B-203967C46295}" type="datetimeFigureOut">
               <a:rPr lang="en-US" smtClean="0"/>
-              <a:t>1/31/15</a:t>
+              <a:t>2/1/15</a:t>
             </a:fld>
             <a:endParaRPr lang="en-US"/>
           </a:p>
@@ -2947,7 +2947,7 @@
           <a:p>
             <a:fld id="{9D6228D5-5F93-BB4A-964B-203967C46295}" type="datetimeFigureOut">
               <a:rPr lang="en-US" smtClean="0"/>
-              <a:t>1/31/15</a:t>
+              <a:t>2/1/15</a:t>
             </a:fld>
             <a:endParaRPr lang="en-US"/>
           </a:p>
@@ -3204,7 +3204,7 @@
           <a:p>
             <a:fld id="{9D6228D5-5F93-BB4A-964B-203967C46295}" type="datetimeFigureOut">
               <a:rPr lang="en-US" smtClean="0"/>
-              <a:t>1/31/15</a:t>
+              <a:t>2/1/15</a:t>
             </a:fld>
             <a:endParaRPr lang="en-US"/>
           </a:p>
@@ -3417,7 +3417,7 @@
           <a:p>
             <a:fld id="{9D6228D5-5F93-BB4A-964B-203967C46295}" type="datetimeFigureOut">
               <a:rPr lang="en-US" smtClean="0"/>
-              <a:t>1/31/15</a:t>
+              <a:t>2/1/15</a:t>
             </a:fld>
             <a:endParaRPr lang="en-US"/>
           </a:p>
@@ -4248,11 +4248,7 @@
           <a:p>
             <a:r>
               <a:rPr lang="en-US" dirty="0" smtClean="0"/>
-              <a:t>One resource can have many </a:t>
-            </a:r>
-            <a:r>
-              <a:rPr lang="en-US" dirty="0" smtClean="0"/>
-              <a:t>DOIs</a:t>
+              <a:t>One resource can have many DOIs</a:t>
             </a:r>
           </a:p>
           <a:p>
@@ -4445,13 +4441,8 @@
           <a:p>
             <a:r>
               <a:rPr lang="en-US" dirty="0" smtClean="0"/>
-              <a:t>ID’s are pointers – they need to point to </a:t>
-            </a:r>
-            <a:r>
-              <a:rPr lang="en-US" dirty="0" smtClean="0"/>
-              <a:t>something</a:t>
-            </a:r>
-            <a:endParaRPr lang="en-US" dirty="0" smtClean="0"/>
+              <a:t>ID’s are pointers – they need to point to something</a:t>
+            </a:r>
           </a:p>
           <a:p>
             <a:r>
@@ -4825,11 +4816,7 @@
           <a:p>
             <a:r>
               <a:rPr lang="en-US" dirty="0" smtClean="0"/>
-              <a:t>Finally: Data </a:t>
-            </a:r>
-            <a:r>
-              <a:rPr lang="en-US" dirty="0" smtClean="0"/>
-              <a:t>objects “version” differently</a:t>
+              <a:t>Finally: Data objects “version” differently</a:t>
             </a:r>
             <a:endParaRPr lang="en-US" dirty="0"/>
           </a:p>
@@ -4946,7 +4933,11 @@
           <a:p>
             <a:r>
               <a:rPr lang="en-US" dirty="0" smtClean="0"/>
-              <a:t>More on this in this afternoon’s lab</a:t>
+              <a:t>More on this in this afternoon’s </a:t>
+            </a:r>
+            <a:r>
+              <a:rPr lang="en-US" dirty="0" smtClean="0"/>
+              <a:t>case study</a:t>
             </a:r>
             <a:endParaRPr lang="en-US" dirty="0"/>
           </a:p>

</xml_diff>